<commit_message>
Update ER diagram to accomplish lab 5a)
</commit_message>
<xml_diff>
--- a/lab2/uppg12.pptx
+++ b/lab2/uppg12.pptx
@@ -2166,7 +2166,7 @@
         </p:nvSpPr>
         <p:spPr>
           <a:xfrm>
-            <a:off x="7687800" y="4896360"/>
+            <a:off x="7578465" y="6046200"/>
             <a:ext cx="360360" cy="1440"/>
           </a:xfrm>
           <a:prstGeom prst="line">
@@ -2188,8 +2188,8 @@
         </p:nvSpPr>
         <p:spPr>
           <a:xfrm>
-            <a:off x="8408520" y="4536000"/>
-            <a:ext cx="215640" cy="215640"/>
+            <a:off x="8414925" y="5598756"/>
+            <a:ext cx="12688" cy="237348"/>
           </a:xfrm>
           <a:prstGeom prst="line">
             <a:avLst/>
@@ -2205,15 +2205,18 @@
       <p:cxnSp>
         <p:nvCxnSpPr>
           <p:cNvPr id="43" name="Line 3"/>
-          <p:cNvCxnSpPr/>
+          <p:cNvCxnSpPr>
+            <a:stCxn id="132" idx="0"/>
+            <a:endCxn id="52" idx="3"/>
+          </p:cNvCxnSpPr>
           <p:nvPr/>
         </p:nvCxnSpPr>
         <p:spPr>
-          <a:xfrm flipV="1">
-            <a:off x="9419040" y="3150360"/>
-            <a:ext cx="100440" cy="411120"/>
-          </a:xfrm>
-          <a:prstGeom prst="bentConnector3">
+          <a:xfrm rot="16200000" flipV="1">
+            <a:off x="8974538" y="4642603"/>
+            <a:ext cx="376740" cy="193130"/>
+          </a:xfrm>
+          <a:prstGeom prst="bentConnector2">
             <a:avLst/>
           </a:prstGeom>
           <a:ln w="9360">
@@ -2250,15 +2253,15 @@
         <p:nvCxnSpPr>
           <p:cNvPr id="45" name="Line 5"/>
           <p:cNvCxnSpPr>
-            <a:stCxn id="49" idx="0"/>
+            <a:stCxn id="234" idx="0"/>
             <a:endCxn id="63" idx="2"/>
           </p:cNvCxnSpPr>
           <p:nvPr/>
         </p:nvCxnSpPr>
         <p:spPr>
-          <a:xfrm rot="16200000" flipV="1">
-            <a:off x="698730" y="2623830"/>
-            <a:ext cx="901140" cy="220320"/>
+          <a:xfrm rot="5400000" flipH="1" flipV="1">
+            <a:off x="565425" y="2749215"/>
+            <a:ext cx="939510" cy="7920"/>
           </a:xfrm>
           <a:prstGeom prst="bentConnector3">
             <a:avLst/>
@@ -2427,12 +2430,12 @@
               </a:lnSpc>
             </a:pPr>
             <a:r>
-              <a:rPr lang="en-US" sz="1400" b="1">
+              <a:rPr lang="en-US" sz="1400" b="1" dirty="0" err="1" smtClean="0">
                 <a:latin typeface="Arial"/>
               </a:rPr>
               <a:t>Dept</a:t>
             </a:r>
-            <a:endParaRPr/>
+            <a:endParaRPr dirty="0"/>
           </a:p>
         </p:txBody>
       </p:sp>
@@ -2444,7 +2447,7 @@
         </p:nvSpPr>
         <p:spPr>
           <a:xfrm>
-            <a:off x="603720" y="3184560"/>
+            <a:off x="362792" y="4607219"/>
             <a:ext cx="1311480" cy="396720"/>
           </a:xfrm>
           <a:prstGeom prst="rect">
@@ -2499,7 +2502,7 @@
         </p:nvSpPr>
         <p:spPr>
           <a:xfrm>
-            <a:off x="1872000" y="4714920"/>
+            <a:off x="1928880" y="5790725"/>
             <a:ext cx="1311120" cy="397080"/>
           </a:xfrm>
           <a:prstGeom prst="rect">
@@ -2554,7 +2557,7 @@
         </p:nvSpPr>
         <p:spPr>
           <a:xfrm>
-            <a:off x="5112000" y="4714920"/>
+            <a:off x="5005337" y="5836104"/>
             <a:ext cx="1311120" cy="397080"/>
           </a:xfrm>
           <a:prstGeom prst="rect">
@@ -2609,7 +2612,7 @@
         </p:nvSpPr>
         <p:spPr>
           <a:xfrm>
-            <a:off x="8208000" y="2952000"/>
+            <a:off x="7755223" y="4352258"/>
             <a:ext cx="1311120" cy="397080"/>
           </a:xfrm>
           <a:prstGeom prst="rect">
@@ -2664,7 +2667,7 @@
         </p:nvSpPr>
         <p:spPr>
           <a:xfrm>
-            <a:off x="864720" y="3888000"/>
+            <a:off x="559814" y="5358303"/>
             <a:ext cx="1295280" cy="609480"/>
           </a:xfrm>
           <a:prstGeom prst="diamond">
@@ -2770,7 +2773,7 @@
         </p:nvSpPr>
         <p:spPr>
           <a:xfrm>
-            <a:off x="3651840" y="3840120"/>
+            <a:off x="3323726" y="4812233"/>
             <a:ext cx="1295280" cy="609480"/>
           </a:xfrm>
           <a:prstGeom prst="diamond">
@@ -2823,7 +2826,7 @@
         </p:nvSpPr>
         <p:spPr>
           <a:xfrm>
-            <a:off x="3520080" y="4609391"/>
+            <a:off x="3637801" y="5411880"/>
             <a:ext cx="1295280" cy="609480"/>
           </a:xfrm>
           <a:prstGeom prst="diamond">
@@ -2982,7 +2985,7 @@
         </p:nvSpPr>
         <p:spPr>
           <a:xfrm>
-            <a:off x="6220080" y="2376000"/>
+            <a:off x="6029147" y="5044436"/>
             <a:ext cx="1295280" cy="609480"/>
           </a:xfrm>
           <a:prstGeom prst="diamond">
@@ -3035,7 +3038,7 @@
         </p:nvSpPr>
         <p:spPr>
           <a:xfrm>
-            <a:off x="6696000" y="4680000"/>
+            <a:off x="6629950" y="5810904"/>
             <a:ext cx="952560" cy="447480"/>
           </a:xfrm>
           <a:prstGeom prst="diamond">
@@ -3306,7 +3309,7 @@
         </p:nvSpPr>
         <p:spPr>
           <a:xfrm>
-            <a:off x="144000" y="2773440"/>
+            <a:off x="1740" y="2796981"/>
             <a:ext cx="838080" cy="304560"/>
           </a:xfrm>
           <a:prstGeom prst="ellipse">
@@ -3361,7 +3364,7 @@
         </p:nvSpPr>
         <p:spPr>
           <a:xfrm>
-            <a:off x="5904000" y="5400000"/>
+            <a:off x="5660538" y="6438799"/>
             <a:ext cx="838080" cy="304920"/>
           </a:xfrm>
           <a:prstGeom prst="ellipse">
@@ -3471,7 +3474,7 @@
         </p:nvSpPr>
         <p:spPr>
           <a:xfrm>
-            <a:off x="3002760" y="5378264"/>
+            <a:off x="3283046" y="6084180"/>
             <a:ext cx="838080" cy="304920"/>
           </a:xfrm>
           <a:prstGeom prst="ellipse">
@@ -3526,7 +3529,7 @@
         </p:nvSpPr>
         <p:spPr>
           <a:xfrm>
-            <a:off x="8208000" y="1927080"/>
+            <a:off x="8911318" y="3388222"/>
             <a:ext cx="838080" cy="304920"/>
           </a:xfrm>
           <a:prstGeom prst="ellipse">
@@ -3581,7 +3584,7 @@
         </p:nvSpPr>
         <p:spPr>
           <a:xfrm>
-            <a:off x="8809920" y="5383080"/>
+            <a:off x="8840433" y="6533280"/>
             <a:ext cx="838080" cy="304920"/>
           </a:xfrm>
           <a:prstGeom prst="ellipse">
@@ -3630,14 +3633,14 @@
       </p:sp>
       <p:sp>
         <p:nvSpPr>
-          <p:cNvPr id="71" name="CustomShape 31"/>
+          <p:cNvPr id="72" name="CustomShape 32"/>
           <p:cNvSpPr/>
           <p:nvPr/>
         </p:nvSpPr>
         <p:spPr>
           <a:xfrm>
-            <a:off x="16343" y="2314260"/>
-            <a:ext cx="838080" cy="304920"/>
+            <a:off x="3049920" y="288000"/>
+            <a:ext cx="838080" cy="304560"/>
           </a:xfrm>
           <a:prstGeom prst="ellipse">
             <a:avLst/>
@@ -3674,10 +3677,10 @@
               </a:lnSpc>
             </a:pPr>
             <a:r>
-              <a:rPr lang="en-US" sz="1200">
+              <a:rPr lang="en-GB" sz="1200">
                 <a:latin typeface="Arial"/>
               </a:rPr>
-              <a:t>account</a:t>
+              <a:t>startyear</a:t>
             </a:r>
             <a:endParaRPr/>
           </a:p>
@@ -3685,14 +3688,14 @@
       </p:sp>
       <p:sp>
         <p:nvSpPr>
-          <p:cNvPr id="72" name="CustomShape 32"/>
+          <p:cNvPr id="73" name="CustomShape 33"/>
           <p:cNvSpPr/>
           <p:nvPr/>
         </p:nvSpPr>
         <p:spPr>
           <a:xfrm>
-            <a:off x="3049920" y="288000"/>
-            <a:ext cx="838080" cy="304560"/>
+            <a:off x="1465560" y="127440"/>
+            <a:ext cx="838440" cy="304560"/>
           </a:xfrm>
           <a:prstGeom prst="ellipse">
             <a:avLst/>
@@ -3732,7 +3735,7 @@
               <a:rPr lang="en-GB" sz="1200">
                 <a:latin typeface="Arial"/>
               </a:rPr>
-              <a:t>startyear</a:t>
+              <a:t>birthyear</a:t>
             </a:r>
             <a:endParaRPr/>
           </a:p>
@@ -3740,14 +3743,14 @@
       </p:sp>
       <p:sp>
         <p:nvSpPr>
-          <p:cNvPr id="73" name="CustomShape 33"/>
+          <p:cNvPr id="74" name="CustomShape 34"/>
           <p:cNvSpPr/>
           <p:nvPr/>
         </p:nvSpPr>
         <p:spPr>
           <a:xfrm>
-            <a:off x="1465560" y="127440"/>
-            <a:ext cx="838440" cy="304560"/>
+            <a:off x="1385640" y="432000"/>
+            <a:ext cx="838440" cy="304920"/>
           </a:xfrm>
           <a:prstGeom prst="ellipse">
             <a:avLst/>
@@ -3784,10 +3787,10 @@
               </a:lnSpc>
             </a:pPr>
             <a:r>
-              <a:rPr lang="en-GB" sz="1200">
+              <a:rPr lang="en-US" sz="1200">
                 <a:latin typeface="Arial"/>
               </a:rPr>
-              <a:t>birthyear</a:t>
+              <a:t>salary</a:t>
             </a:r>
             <a:endParaRPr/>
           </a:p>
@@ -3795,14 +3798,14 @@
       </p:sp>
       <p:sp>
         <p:nvSpPr>
-          <p:cNvPr id="74" name="CustomShape 34"/>
+          <p:cNvPr id="75" name="CustomShape 35"/>
           <p:cNvSpPr/>
           <p:nvPr/>
         </p:nvSpPr>
         <p:spPr>
           <a:xfrm>
-            <a:off x="1385640" y="432000"/>
-            <a:ext cx="838440" cy="304920"/>
+            <a:off x="9044177" y="5307905"/>
+            <a:ext cx="838080" cy="304920"/>
           </a:xfrm>
           <a:prstGeom prst="ellipse">
             <a:avLst/>
@@ -3842,7 +3845,7 @@
               <a:rPr lang="en-US" sz="1200">
                 <a:latin typeface="Arial"/>
               </a:rPr>
-              <a:t>salary</a:t>
+              <a:t>weight</a:t>
             </a:r>
             <a:endParaRPr/>
           </a:p>
@@ -3850,13 +3853,13 @@
       </p:sp>
       <p:sp>
         <p:nvSpPr>
-          <p:cNvPr id="75" name="CustomShape 35"/>
+          <p:cNvPr id="76" name="CustomShape 36"/>
           <p:cNvSpPr/>
           <p:nvPr/>
         </p:nvSpPr>
         <p:spPr>
           <a:xfrm>
-            <a:off x="9072000" y="2575080"/>
+            <a:off x="9044177" y="4047338"/>
             <a:ext cx="838080" cy="304920"/>
           </a:xfrm>
           <a:prstGeom prst="ellipse">
@@ -3894,10 +3897,10 @@
               </a:lnSpc>
             </a:pPr>
             <a:r>
-              <a:rPr lang="en-US" sz="1200">
+              <a:rPr lang="en-GB" sz="1200">
                 <a:latin typeface="Arial"/>
               </a:rPr>
-              <a:t>weight</a:t>
+              <a:t>color</a:t>
             </a:r>
             <a:endParaRPr/>
           </a:p>
@@ -3905,14 +3908,14 @@
       </p:sp>
       <p:sp>
         <p:nvSpPr>
-          <p:cNvPr id="76" name="CustomShape 36"/>
+          <p:cNvPr id="77" name="CustomShape 37"/>
           <p:cNvSpPr/>
           <p:nvPr/>
         </p:nvSpPr>
         <p:spPr>
           <a:xfrm>
-            <a:off x="9025920" y="1927080"/>
-            <a:ext cx="838080" cy="304920"/>
+            <a:off x="4642750" y="6447900"/>
+            <a:ext cx="838440" cy="304920"/>
           </a:xfrm>
           <a:prstGeom prst="ellipse">
             <a:avLst/>
@@ -3949,10 +3952,10 @@
               </a:lnSpc>
             </a:pPr>
             <a:r>
-              <a:rPr lang="en-GB" sz="1200">
+              <a:rPr lang="en-US" sz="1200">
                 <a:latin typeface="Arial"/>
               </a:rPr>
-              <a:t>color</a:t>
+              <a:t>name</a:t>
             </a:r>
             <a:endParaRPr/>
           </a:p>
@@ -3960,13 +3963,13 @@
       </p:sp>
       <p:sp>
         <p:nvSpPr>
-          <p:cNvPr id="77" name="CustomShape 37"/>
+          <p:cNvPr id="78" name="CustomShape 38"/>
           <p:cNvSpPr/>
           <p:nvPr/>
         </p:nvSpPr>
         <p:spPr>
           <a:xfrm>
-            <a:off x="4896000" y="5400000"/>
+            <a:off x="2401560" y="6451920"/>
             <a:ext cx="838440" cy="304920"/>
           </a:xfrm>
           <a:prstGeom prst="ellipse">
@@ -4004,10 +4007,10 @@
               </a:lnSpc>
             </a:pPr>
             <a:r>
-              <a:rPr lang="en-US" sz="1200">
+              <a:rPr lang="en-GB" sz="1200">
                 <a:latin typeface="Arial"/>
               </a:rPr>
-              <a:t>name</a:t>
+              <a:t>qoh</a:t>
             </a:r>
             <a:endParaRPr/>
           </a:p>
@@ -4015,14 +4018,14 @@
       </p:sp>
       <p:sp>
         <p:nvSpPr>
-          <p:cNvPr id="78" name="CustomShape 38"/>
+          <p:cNvPr id="79" name="CustomShape 39"/>
           <p:cNvSpPr/>
           <p:nvPr/>
         </p:nvSpPr>
         <p:spPr>
           <a:xfrm>
-            <a:off x="1995120" y="5832000"/>
-            <a:ext cx="838440" cy="304920"/>
+            <a:off x="9026516" y="3718882"/>
+            <a:ext cx="838080" cy="304920"/>
           </a:xfrm>
           <a:prstGeom prst="ellipse">
             <a:avLst/>
@@ -4070,14 +4073,14 @@
       </p:sp>
       <p:sp>
         <p:nvSpPr>
-          <p:cNvPr id="79" name="CustomShape 39"/>
+          <p:cNvPr id="80" name="CustomShape 40"/>
           <p:cNvSpPr/>
           <p:nvPr/>
         </p:nvSpPr>
         <p:spPr>
           <a:xfrm>
-            <a:off x="8606880" y="2232000"/>
-            <a:ext cx="838080" cy="304920"/>
+            <a:off x="8640000" y="288000"/>
+            <a:ext cx="838080" cy="304560"/>
           </a:xfrm>
           <a:prstGeom prst="ellipse">
             <a:avLst/>
@@ -4114,10 +4117,10 @@
               </a:lnSpc>
             </a:pPr>
             <a:r>
-              <a:rPr lang="en-GB" sz="1200">
+              <a:rPr lang="en-US" sz="1200">
                 <a:latin typeface="Arial"/>
               </a:rPr>
-              <a:t>qoh</a:t>
+              <a:t>state</a:t>
             </a:r>
             <a:endParaRPr/>
           </a:p>
@@ -4125,14 +4128,14 @@
       </p:sp>
       <p:sp>
         <p:nvSpPr>
-          <p:cNvPr id="80" name="CustomShape 40"/>
+          <p:cNvPr id="81" name="CustomShape 41"/>
           <p:cNvSpPr/>
           <p:nvPr/>
         </p:nvSpPr>
         <p:spPr>
           <a:xfrm>
-            <a:off x="8640000" y="288000"/>
-            <a:ext cx="838080" cy="304560"/>
+            <a:off x="6865920" y="144000"/>
+            <a:ext cx="838080" cy="304920"/>
           </a:xfrm>
           <a:prstGeom prst="ellipse">
             <a:avLst/>
@@ -4169,10 +4172,10 @@
               </a:lnSpc>
             </a:pPr>
             <a:r>
-              <a:rPr lang="en-US" sz="1200">
+              <a:rPr lang="en-US" sz="1200" u="sng">
                 <a:latin typeface="Arial"/>
               </a:rPr>
-              <a:t>state</a:t>
+              <a:t>key</a:t>
             </a:r>
             <a:endParaRPr/>
           </a:p>
@@ -4180,13 +4183,13 @@
       </p:sp>
       <p:sp>
         <p:nvSpPr>
-          <p:cNvPr id="81" name="CustomShape 41"/>
+          <p:cNvPr id="82" name="CustomShape 42"/>
           <p:cNvSpPr/>
           <p:nvPr/>
         </p:nvSpPr>
         <p:spPr>
           <a:xfrm>
-            <a:off x="6865920" y="144000"/>
+            <a:off x="6289920" y="1495080"/>
             <a:ext cx="838080" cy="304920"/>
           </a:xfrm>
           <a:prstGeom prst="ellipse">
@@ -4224,10 +4227,10 @@
               </a:lnSpc>
             </a:pPr>
             <a:r>
-              <a:rPr lang="en-US" sz="1200" u="sng">
+              <a:rPr lang="en-US" sz="1200">
                 <a:latin typeface="Arial"/>
               </a:rPr>
-              <a:t>key</a:t>
+              <a:t>name</a:t>
             </a:r>
             <a:endParaRPr/>
           </a:p>
@@ -4235,13 +4238,13 @@
       </p:sp>
       <p:sp>
         <p:nvSpPr>
-          <p:cNvPr id="82" name="CustomShape 42"/>
+          <p:cNvPr id="83" name="CustomShape 43"/>
           <p:cNvSpPr/>
           <p:nvPr/>
         </p:nvSpPr>
         <p:spPr>
           <a:xfrm>
-            <a:off x="6289920" y="1495080"/>
+            <a:off x="82764" y="6059763"/>
             <a:ext cx="838080" cy="304920"/>
           </a:xfrm>
           <a:prstGeom prst="ellipse">
@@ -4282,7 +4285,7 @@
               <a:rPr lang="en-US" sz="1200">
                 <a:latin typeface="Arial"/>
               </a:rPr>
-              <a:t>name</a:t>
+              <a:t>quantity</a:t>
             </a:r>
             <a:endParaRPr/>
           </a:p>
@@ -4290,14 +4293,14 @@
       </p:sp>
       <p:sp>
         <p:nvSpPr>
-          <p:cNvPr id="83" name="CustomShape 43"/>
+          <p:cNvPr id="84" name="CustomShape 44"/>
           <p:cNvSpPr/>
           <p:nvPr/>
         </p:nvSpPr>
         <p:spPr>
           <a:xfrm>
-            <a:off x="435383" y="4449600"/>
-            <a:ext cx="838080" cy="304920"/>
+            <a:off x="-13537" y="5165193"/>
+            <a:ext cx="838080" cy="304560"/>
           </a:xfrm>
           <a:prstGeom prst="ellipse">
             <a:avLst/>
@@ -4305,10 +4308,13 @@
           <a:solidFill>
             <a:srgbClr val="FFFFFF"/>
           </a:solidFill>
-          <a:ln w="3240">
-            <a:solidFill>
-              <a:srgbClr val="000000"/>
-            </a:solidFill>
+          <a:ln w="6480">
+            <a:solidFill>
+              <a:srgbClr val="000000"/>
+            </a:solidFill>
+            <a:custDash>
+              <a:ds d="800000" sp="300000"/>
+            </a:custDash>
             <a:miter/>
           </a:ln>
         </p:spPr>
@@ -4334,64 +4340,6 @@
               </a:lnSpc>
             </a:pPr>
             <a:r>
-              <a:rPr lang="en-US" sz="1200">
-                <a:latin typeface="Arial"/>
-              </a:rPr>
-              <a:t>quantity</a:t>
-            </a:r>
-            <a:endParaRPr/>
-          </a:p>
-        </p:txBody>
-      </p:sp>
-      <p:sp>
-        <p:nvSpPr>
-          <p:cNvPr id="84" name="CustomShape 44"/>
-          <p:cNvSpPr/>
-          <p:nvPr/>
-        </p:nvSpPr>
-        <p:spPr>
-          <a:xfrm>
-            <a:off x="1994842" y="3232620"/>
-            <a:ext cx="838080" cy="304560"/>
-          </a:xfrm>
-          <a:prstGeom prst="ellipse">
-            <a:avLst/>
-          </a:prstGeom>
-          <a:solidFill>
-            <a:srgbClr val="FFFFFF"/>
-          </a:solidFill>
-          <a:ln w="6480">
-            <a:solidFill>
-              <a:srgbClr val="000000"/>
-            </a:solidFill>
-            <a:custDash>
-              <a:ds d="800000" sp="300000"/>
-            </a:custDash>
-            <a:miter/>
-          </a:ln>
-        </p:spPr>
-        <p:style>
-          <a:lnRef idx="0">
-            <a:scrgbClr r="0" g="0" b="0"/>
-          </a:lnRef>
-          <a:fillRef idx="0">
-            <a:scrgbClr r="0" g="0" b="0"/>
-          </a:fillRef>
-          <a:effectRef idx="0">
-            <a:scrgbClr r="0" g="0" b="0"/>
-          </a:effectRef>
-          <a:fontRef idx="minor"/>
-        </p:style>
-        <p:txBody>
-          <a:bodyPr wrap="none" lIns="90000" tIns="46800" rIns="90000" bIns="46800" anchor="ctr"/>
-          <a:lstStyle/>
-          <a:p>
-            <a:pPr algn="ctr">
-              <a:lnSpc>
-                <a:spcPct val="100000"/>
-              </a:lnSpc>
-            </a:pPr>
-            <a:r>
               <a:rPr lang="en-US" sz="1200" dirty="0">
                 <a:latin typeface="Arial"/>
               </a:rPr>
@@ -4409,7 +4357,7 @@
         </p:nvSpPr>
         <p:spPr>
           <a:xfrm>
-            <a:off x="2833560" y="5815440"/>
+            <a:off x="3329280" y="6451920"/>
             <a:ext cx="838440" cy="304560"/>
           </a:xfrm>
           <a:prstGeom prst="ellipse">
@@ -4559,44 +4507,19 @@
         <p:nvCxnSpPr>
           <p:cNvPr id="90" name="Line 50"/>
           <p:cNvCxnSpPr>
-            <a:stCxn id="134" idx="0"/>
-            <a:endCxn id="49" idx="1"/>
+            <a:stCxn id="134" idx="3"/>
+            <a:endCxn id="234" idx="0"/>
           </p:cNvCxnSpPr>
           <p:nvPr/>
         </p:nvCxnSpPr>
         <p:spPr>
-          <a:xfrm rot="5400000" flipH="1" flipV="1">
-            <a:off x="359872" y="3482872"/>
-            <a:ext cx="343800" cy="143896"/>
-          </a:xfrm>
-          <a:prstGeom prst="bentConnector2">
-            <a:avLst/>
-          </a:prstGeom>
-          <a:ln w="9360">
-            <a:solidFill>
-              <a:srgbClr val="000000"/>
-            </a:solidFill>
-            <a:round/>
-          </a:ln>
-        </p:spPr>
-      </p:cxnSp>
-      <p:cxnSp>
-        <p:nvCxnSpPr>
-          <p:cNvPr id="91" name="Line 51"/>
-          <p:cNvCxnSpPr>
-            <a:stCxn id="71" idx="4"/>
-            <a:endCxn id="49" idx="0"/>
-          </p:cNvCxnSpPr>
-          <p:nvPr/>
-        </p:nvCxnSpPr>
-        <p:spPr>
-          <a:xfrm rot="16200000" flipH="1">
-            <a:off x="564731" y="2489831"/>
-            <a:ext cx="565380" cy="824077"/>
+          <a:xfrm rot="5400000">
+            <a:off x="1069133" y="3088510"/>
+            <a:ext cx="96507" cy="172332"/>
           </a:xfrm>
           <a:prstGeom prst="bentConnector3">
             <a:avLst>
-              <a:gd name="adj1" fmla="val 20594"/>
+              <a:gd name="adj1" fmla="val 50000"/>
             </a:avLst>
           </a:prstGeom>
           <a:ln w="9360">
@@ -4612,17 +4535,19 @@
           <p:cNvPr id="92" name="Line 52"/>
           <p:cNvCxnSpPr>
             <a:stCxn id="65" idx="5"/>
-            <a:endCxn id="49" idx="0"/>
+            <a:endCxn id="234" idx="0"/>
           </p:cNvCxnSpPr>
           <p:nvPr/>
         </p:nvCxnSpPr>
         <p:spPr>
-          <a:xfrm>
-            <a:off x="859320" y="3033360"/>
-            <a:ext cx="400320" cy="151560"/>
+          <a:xfrm rot="16200000" flipH="1">
+            <a:off x="791158" y="2982867"/>
+            <a:ext cx="165991" cy="314134"/>
           </a:xfrm>
           <a:prstGeom prst="bentConnector3">
-            <a:avLst/>
+            <a:avLst>
+              <a:gd name="adj1" fmla="val 50000"/>
+            </a:avLst>
           </a:prstGeom>
           <a:ln w="9360">
             <a:solidFill>
@@ -4636,18 +4561,21 @@
         <p:nvCxnSpPr>
           <p:cNvPr id="93" name="Line 53"/>
           <p:cNvCxnSpPr>
-            <a:stCxn id="84" idx="2"/>
-            <a:endCxn id="49" idx="3"/>
+            <a:stCxn id="84" idx="0"/>
+            <a:endCxn id="49" idx="1"/>
           </p:cNvCxnSpPr>
           <p:nvPr/>
         </p:nvCxnSpPr>
         <p:spPr>
-          <a:xfrm rot="10800000">
-            <a:off x="1915200" y="3382920"/>
-            <a:ext cx="79642" cy="1980"/>
-          </a:xfrm>
-          <a:prstGeom prst="bentConnector3">
-            <a:avLst/>
+          <a:xfrm rot="16200000" flipV="1">
+            <a:off x="204341" y="4964030"/>
+            <a:ext cx="359614" cy="42711"/>
+          </a:xfrm>
+          <a:prstGeom prst="bentConnector4">
+            <a:avLst>
+              <a:gd name="adj1" fmla="val 22420"/>
+              <a:gd name="adj2" fmla="val 280342"/>
+            </a:avLst>
           </a:prstGeom>
           <a:ln w="9360">
             <a:solidFill>
@@ -4667,9 +4595,9 @@
           <p:nvPr/>
         </p:nvCxnSpPr>
         <p:spPr>
-          <a:xfrm flipH="1" flipV="1">
-            <a:off x="1259280" y="3581280"/>
-            <a:ext cx="253440" cy="307080"/>
+          <a:xfrm rot="16200000" flipV="1">
+            <a:off x="935811" y="5086660"/>
+            <a:ext cx="354364" cy="188922"/>
           </a:xfrm>
           <a:prstGeom prst="bentConnector3">
             <a:avLst/>
@@ -4693,10 +4621,10 @@
         </p:nvCxnSpPr>
         <p:spPr>
           <a:xfrm>
-            <a:off x="2160000" y="4192920"/>
-            <a:ext cx="367920" cy="522360"/>
-          </a:xfrm>
-          <a:prstGeom prst="bentConnector3">
+            <a:off x="1855094" y="5663043"/>
+            <a:ext cx="729346" cy="127682"/>
+          </a:xfrm>
+          <a:prstGeom prst="bentConnector2">
             <a:avLst/>
           </a:prstGeom>
           <a:ln w="9360">
@@ -4718,8 +4646,8 @@
         </p:nvCxnSpPr>
         <p:spPr>
           <a:xfrm rot="5400000" flipH="1" flipV="1">
-            <a:off x="731141" y="4316022"/>
-            <a:ext cx="256860" cy="10297"/>
+            <a:off x="332449" y="5832398"/>
+            <a:ext cx="396720" cy="58010"/>
           </a:xfrm>
           <a:prstGeom prst="bentConnector2">
             <a:avLst/>
@@ -4736,14 +4664,15 @@
         <p:nvCxnSpPr>
           <p:cNvPr id="97" name="Line 57"/>
           <p:cNvCxnSpPr>
+            <a:stCxn id="131" idx="0"/>
             <a:endCxn id="50" idx="2"/>
           </p:cNvCxnSpPr>
           <p:nvPr/>
         </p:nvCxnSpPr>
         <p:spPr>
-          <a:xfrm flipV="1">
-            <a:off x="2003400" y="5112000"/>
-            <a:ext cx="524520" cy="100080"/>
+          <a:xfrm rot="5400000" flipH="1" flipV="1">
+            <a:off x="2137673" y="6005154"/>
+            <a:ext cx="264115" cy="629419"/>
           </a:xfrm>
           <a:prstGeom prst="bentConnector3">
             <a:avLst/>
@@ -4767,8 +4696,8 @@
         </p:nvCxnSpPr>
         <p:spPr>
           <a:xfrm rot="10800000">
-            <a:off x="2527560" y="5112000"/>
-            <a:ext cx="475200" cy="418724"/>
+            <a:off x="2584440" y="6187806"/>
+            <a:ext cx="698606" cy="48835"/>
           </a:xfrm>
           <a:prstGeom prst="bentConnector2">
             <a:avLst/>
@@ -4785,18 +4714,20 @@
         <p:nvCxnSpPr>
           <p:cNvPr id="99" name="Line 59"/>
           <p:cNvCxnSpPr>
-            <a:stCxn id="85" idx="0"/>
+            <a:stCxn id="85" idx="1"/>
             <a:endCxn id="50" idx="2"/>
           </p:cNvCxnSpPr>
           <p:nvPr/>
         </p:nvCxnSpPr>
         <p:spPr>
-          <a:xfrm flipH="1" flipV="1">
-            <a:off x="2527560" y="5112000"/>
-            <a:ext cx="725760" cy="703800"/>
+          <a:xfrm rot="16200000" flipV="1">
+            <a:off x="2863896" y="5908350"/>
+            <a:ext cx="308717" cy="867627"/>
           </a:xfrm>
           <a:prstGeom prst="bentConnector3">
-            <a:avLst/>
+            <a:avLst>
+              <a:gd name="adj1" fmla="val 28060"/>
+            </a:avLst>
           </a:prstGeom>
           <a:ln w="9360">
             <a:solidFill>
@@ -4816,9 +4747,9 @@
           <p:nvPr/>
         </p:nvCxnSpPr>
         <p:spPr>
-          <a:xfrm flipV="1">
-            <a:off x="2414520" y="5112000"/>
-            <a:ext cx="113400" cy="720360"/>
+          <a:xfrm rot="16200000" flipV="1">
+            <a:off x="2570553" y="6201693"/>
+            <a:ext cx="264115" cy="236340"/>
           </a:xfrm>
           <a:prstGeom prst="bentConnector3">
             <a:avLst/>
@@ -4841,9 +4772,9 @@
           <p:nvPr/>
         </p:nvCxnSpPr>
         <p:spPr>
-          <a:xfrm>
-            <a:off x="3183120" y="4913460"/>
-            <a:ext cx="336960" cy="671"/>
+          <a:xfrm flipV="1">
+            <a:off x="3240000" y="5716620"/>
+            <a:ext cx="397801" cy="272645"/>
           </a:xfrm>
           <a:prstGeom prst="bentConnector3">
             <a:avLst/>
@@ -4866,12 +4797,14 @@
           <p:nvPr/>
         </p:nvCxnSpPr>
         <p:spPr>
-          <a:xfrm flipV="1">
-            <a:off x="4815360" y="4913460"/>
-            <a:ext cx="296640" cy="671"/>
+          <a:xfrm>
+            <a:off x="4933081" y="5716620"/>
+            <a:ext cx="72256" cy="318024"/>
           </a:xfrm>
           <a:prstGeom prst="bentConnector3">
-            <a:avLst/>
+            <a:avLst>
+              <a:gd name="adj1" fmla="val 50000"/>
+            </a:avLst>
           </a:prstGeom>
           <a:ln w="9360">
             <a:solidFill>
@@ -4891,9 +4824,9 @@
           <p:nvPr/>
         </p:nvCxnSpPr>
         <p:spPr>
-          <a:xfrm flipV="1">
-            <a:off x="5611680" y="5112000"/>
-            <a:ext cx="156240" cy="333000"/>
+          <a:xfrm rot="5400000" flipH="1" flipV="1">
+            <a:off x="5379965" y="6211623"/>
+            <a:ext cx="259371" cy="302494"/>
           </a:xfrm>
           <a:prstGeom prst="bentConnector3">
             <a:avLst/>
@@ -4916,9 +4849,9 @@
           <p:nvPr/>
         </p:nvCxnSpPr>
         <p:spPr>
-          <a:xfrm flipH="1" flipV="1">
-            <a:off x="5767560" y="5112000"/>
-            <a:ext cx="555840" cy="288360"/>
+          <a:xfrm rot="16200000" flipV="1">
+            <a:off x="5767431" y="6126651"/>
+            <a:ext cx="205615" cy="418681"/>
           </a:xfrm>
           <a:prstGeom prst="bentConnector3">
             <a:avLst/>
@@ -4941,9 +4874,9 @@
           <p:nvPr/>
         </p:nvCxnSpPr>
         <p:spPr>
-          <a:xfrm flipV="1">
-            <a:off x="6423120" y="4903920"/>
-            <a:ext cx="273240" cy="9720"/>
+          <a:xfrm>
+            <a:off x="6316457" y="6034644"/>
+            <a:ext cx="313493" cy="12700"/>
           </a:xfrm>
           <a:prstGeom prst="bentConnector3">
             <a:avLst/>
@@ -4964,7 +4897,7 @@
         </p:nvCxnSpPr>
         <p:spPr>
           <a:xfrm flipH="1">
-            <a:off x="8123400" y="5102640"/>
+            <a:off x="8014065" y="6252480"/>
             <a:ext cx="509040" cy="297720"/>
           </a:xfrm>
           <a:prstGeom prst="bentConnector3">
@@ -4981,14 +4914,12 @@
       <p:cxnSp>
         <p:nvCxnSpPr>
           <p:cNvPr id="107" name="Line 67"/>
-          <p:cNvCxnSpPr>
-            <a:endCxn id="70" idx="0"/>
-          </p:cNvCxnSpPr>
+          <p:cNvCxnSpPr/>
           <p:nvPr/>
         </p:nvCxnSpPr>
         <p:spPr>
           <a:xfrm>
-            <a:off x="8632080" y="5102640"/>
+            <a:off x="8522745" y="6252480"/>
             <a:ext cx="597240" cy="280800"/>
           </a:xfrm>
           <a:prstGeom prst="bentConnector3">
@@ -5006,17 +4937,17 @@
         <p:nvCxnSpPr>
           <p:cNvPr id="108" name="Line 68"/>
           <p:cNvCxnSpPr>
-            <a:stCxn id="69" idx="3"/>
+            <a:stCxn id="79" idx="2"/>
             <a:endCxn id="52" idx="0"/>
           </p:cNvCxnSpPr>
           <p:nvPr/>
         </p:nvCxnSpPr>
         <p:spPr>
-          <a:xfrm>
-            <a:off x="8330760" y="2187360"/>
-            <a:ext cx="533160" cy="765000"/>
-          </a:xfrm>
-          <a:prstGeom prst="bentConnector3">
+          <a:xfrm rot="10800000" flipV="1">
+            <a:off x="8410784" y="3871342"/>
+            <a:ext cx="615733" cy="480916"/>
+          </a:xfrm>
+          <a:prstGeom prst="bentConnector2">
             <a:avLst/>
           </a:prstGeom>
           <a:ln w="9360">
@@ -5031,17 +4962,17 @@
         <p:nvCxnSpPr>
           <p:cNvPr id="109" name="Line 69"/>
           <p:cNvCxnSpPr>
-            <a:stCxn id="79" idx="3"/>
+            <a:stCxn id="69" idx="2"/>
             <a:endCxn id="52" idx="0"/>
           </p:cNvCxnSpPr>
           <p:nvPr/>
         </p:nvCxnSpPr>
         <p:spPr>
-          <a:xfrm>
-            <a:off x="8729640" y="2492280"/>
-            <a:ext cx="134280" cy="460080"/>
-          </a:xfrm>
-          <a:prstGeom prst="bentConnector3">
+          <a:xfrm rot="10800000" flipV="1">
+            <a:off x="8410784" y="3540682"/>
+            <a:ext cx="500535" cy="811576"/>
+          </a:xfrm>
+          <a:prstGeom prst="bentConnector2">
             <a:avLst/>
           </a:prstGeom>
           <a:ln w="9360">
@@ -5057,16 +4988,16 @@
           <p:cNvPr id="110" name="Line 70"/>
           <p:cNvCxnSpPr>
             <a:stCxn id="76" idx="4"/>
-            <a:endCxn id="52" idx="0"/>
+            <a:endCxn id="52" idx="3"/>
           </p:cNvCxnSpPr>
           <p:nvPr/>
         </p:nvCxnSpPr>
         <p:spPr>
-          <a:xfrm flipH="1">
-            <a:off x="8863560" y="2232000"/>
-            <a:ext cx="581760" cy="720360"/>
-          </a:xfrm>
-          <a:prstGeom prst="bentConnector3">
+          <a:xfrm rot="5400000">
+            <a:off x="9165510" y="4253091"/>
+            <a:ext cx="198540" cy="396874"/>
+          </a:xfrm>
+          <a:prstGeom prst="bentConnector2">
             <a:avLst/>
           </a:prstGeom>
           <a:ln w="9360">
@@ -5081,17 +5012,17 @@
         <p:nvCxnSpPr>
           <p:cNvPr id="111" name="Line 71"/>
           <p:cNvCxnSpPr>
-            <a:stCxn id="75" idx="2"/>
-            <a:endCxn id="52" idx="0"/>
+            <a:stCxn id="75" idx="7"/>
+            <a:endCxn id="52" idx="3"/>
           </p:cNvCxnSpPr>
           <p:nvPr/>
         </p:nvCxnSpPr>
         <p:spPr>
-          <a:xfrm flipH="1">
-            <a:off x="8863560" y="2727720"/>
-            <a:ext cx="208800" cy="224640"/>
-          </a:xfrm>
-          <a:prstGeom prst="bentConnector3">
+          <a:xfrm rot="16200000" flipV="1">
+            <a:off x="9012052" y="4605089"/>
+            <a:ext cx="801762" cy="693180"/>
+          </a:xfrm>
+          <a:prstGeom prst="bentConnector2">
             <a:avLst/>
           </a:prstGeom>
           <a:ln w="9360">
@@ -5112,11 +5043,11 @@
           <p:nvPr/>
         </p:nvCxnSpPr>
         <p:spPr>
-          <a:xfrm flipV="1">
-            <a:off x="5767560" y="2680920"/>
-            <a:ext cx="452880" cy="2034360"/>
-          </a:xfrm>
-          <a:prstGeom prst="bentConnector3">
+          <a:xfrm rot="5400000" flipH="1" flipV="1">
+            <a:off x="5601558" y="5408515"/>
+            <a:ext cx="486928" cy="368250"/>
+          </a:xfrm>
+          <a:prstGeom prst="bentConnector2">
             <a:avLst/>
           </a:prstGeom>
           <a:ln w="9360">
@@ -5131,18 +5062,20 @@
         <p:nvCxnSpPr>
           <p:cNvPr id="113" name="Line 73"/>
           <p:cNvCxnSpPr>
-            <a:stCxn id="59" idx="3"/>
+            <a:stCxn id="59" idx="0"/>
             <a:endCxn id="47" idx="2"/>
           </p:cNvCxnSpPr>
           <p:nvPr/>
         </p:nvCxnSpPr>
         <p:spPr>
-          <a:xfrm flipV="1">
-            <a:off x="7515360" y="1456920"/>
-            <a:ext cx="613080" cy="1224360"/>
+          <a:xfrm rot="5400000" flipH="1" flipV="1">
+            <a:off x="5608765" y="2524942"/>
+            <a:ext cx="3587516" cy="1451473"/>
           </a:xfrm>
           <a:prstGeom prst="bentConnector3">
-            <a:avLst/>
+            <a:avLst>
+              <a:gd name="adj1" fmla="val 21096"/>
+            </a:avLst>
           </a:prstGeom>
           <a:ln w="9360">
             <a:solidFill>
@@ -5511,11 +5444,11 @@
           <p:nvPr/>
         </p:nvCxnSpPr>
         <p:spPr>
-          <a:xfrm flipV="1">
-            <a:off x="2527560" y="4145040"/>
-            <a:ext cx="1124640" cy="570240"/>
-          </a:xfrm>
-          <a:prstGeom prst="bentConnector3">
+          <a:xfrm rot="5400000" flipH="1" flipV="1">
+            <a:off x="2617207" y="5084206"/>
+            <a:ext cx="673752" cy="739286"/>
+          </a:xfrm>
+          <a:prstGeom prst="bentConnector2">
             <a:avLst/>
           </a:prstGeom>
           <a:ln w="9360">
@@ -5537,10 +5470,10 @@
         </p:nvCxnSpPr>
         <p:spPr>
           <a:xfrm flipV="1">
-            <a:off x="4947120" y="2053080"/>
-            <a:ext cx="388800" cy="2092320"/>
-          </a:xfrm>
-          <a:prstGeom prst="bentConnector3">
+            <a:off x="4619006" y="2053080"/>
+            <a:ext cx="716734" cy="3063893"/>
+          </a:xfrm>
+          <a:prstGeom prst="bentConnector2">
             <a:avLst/>
           </a:prstGeom>
           <a:ln w="9360">
@@ -5614,7 +5547,7 @@
         </p:nvSpPr>
         <p:spPr>
           <a:xfrm>
-            <a:off x="1584000" y="5211720"/>
+            <a:off x="1535801" y="6451920"/>
             <a:ext cx="838440" cy="304920"/>
           </a:xfrm>
           <a:prstGeom prst="ellipse">
@@ -5669,7 +5602,7 @@
         </p:nvSpPr>
         <p:spPr>
           <a:xfrm>
-            <a:off x="9000000" y="3561120"/>
+            <a:off x="8840433" y="4927538"/>
             <a:ext cx="838080" cy="304920"/>
           </a:xfrm>
           <a:prstGeom prst="ellipse">
@@ -5779,7 +5712,7 @@
         </p:nvSpPr>
         <p:spPr>
           <a:xfrm>
-            <a:off x="40784" y="3726720"/>
+            <a:off x="1080818" y="2866465"/>
             <a:ext cx="838080" cy="304560"/>
           </a:xfrm>
           <a:prstGeom prst="ellipse">
@@ -5914,7 +5847,7 @@
         </p:nvSpPr>
         <p:spPr>
           <a:xfrm>
-            <a:off x="7704000" y="5400000"/>
+            <a:off x="7589173" y="6550129"/>
             <a:ext cx="838440" cy="304920"/>
           </a:xfrm>
           <a:prstGeom prst="ellipse">
@@ -5969,7 +5902,7 @@
         </p:nvSpPr>
         <p:spPr>
           <a:xfrm>
-            <a:off x="7875720" y="5650920"/>
+            <a:off x="7766385" y="6800760"/>
             <a:ext cx="504720" cy="1440"/>
           </a:xfrm>
           <a:prstGeom prst="line">
@@ -5994,7 +5927,7 @@
         </p:nvSpPr>
         <p:spPr>
           <a:xfrm>
-            <a:off x="7976520" y="4705560"/>
+            <a:off x="7867185" y="5855400"/>
             <a:ext cx="1311480" cy="397080"/>
           </a:xfrm>
           <a:prstGeom prst="rect">
@@ -6049,7 +5982,7 @@
         </p:nvSpPr>
         <p:spPr>
           <a:xfrm>
-            <a:off x="7976520" y="4104000"/>
+            <a:off x="7951333" y="5171049"/>
             <a:ext cx="952560" cy="447840"/>
           </a:xfrm>
           <a:prstGeom prst="diamond">
@@ -6085,12 +6018,12 @@
               </a:lnSpc>
             </a:pPr>
             <a:r>
-              <a:rPr lang="en-US" sz="1200" b="1">
+              <a:rPr lang="en-US" sz="1200" b="1" dirty="0">
                 <a:latin typeface="Arial"/>
               </a:rPr>
               <a:t>contains</a:t>
             </a:r>
-            <a:endParaRPr/>
+            <a:endParaRPr dirty="0"/>
           </a:p>
         </p:txBody>
       </p:sp>
@@ -6104,9 +6037,9 @@
           <p:nvPr/>
         </p:nvCxnSpPr>
         <p:spPr>
-          <a:xfrm flipV="1">
-            <a:off x="8452800" y="3349080"/>
-            <a:ext cx="411120" cy="755280"/>
+          <a:xfrm rot="16200000" flipV="1">
+            <a:off x="8208343" y="4951779"/>
+            <a:ext cx="421711" cy="16830"/>
           </a:xfrm>
           <a:prstGeom prst="bentConnector3">
             <a:avLst/>
@@ -6201,58 +6134,13 @@
       </p:cxnSp>
       <p:sp>
         <p:nvSpPr>
-          <p:cNvPr id="144" name="CustomShape 104"/>
-          <p:cNvSpPr/>
-          <p:nvPr/>
-        </p:nvSpPr>
-        <p:spPr>
-          <a:xfrm>
-            <a:off x="7507440" y="6629400"/>
-            <a:ext cx="2398320" cy="231120"/>
-          </a:xfrm>
-          <a:prstGeom prst="rect">
-            <a:avLst/>
-          </a:prstGeom>
-          <a:noFill/>
-          <a:ln>
-            <a:noFill/>
-          </a:ln>
-        </p:spPr>
-        <p:style>
-          <a:lnRef idx="0">
-            <a:scrgbClr r="0" g="0" b="0"/>
-          </a:lnRef>
-          <a:fillRef idx="0">
-            <a:scrgbClr r="0" g="0" b="0"/>
-          </a:fillRef>
-          <a:effectRef idx="0">
-            <a:scrgbClr r="0" g="0" b="0"/>
-          </a:effectRef>
-          <a:fontRef idx="minor"/>
-        </p:style>
-        <p:txBody>
-          <a:bodyPr wrap="none" lIns="90000" tIns="46800" rIns="90000" bIns="46800"/>
-          <a:lstStyle/>
-          <a:p>
-            <a:r>
-              <a:rPr lang="sv-SE" sz="900">
-                <a:latin typeface="Times New Roman"/>
-              </a:rPr>
-              <a:t>Do not forget to add cardinalities: 1:N, N:M etc.</a:t>
-            </a:r>
-            <a:endParaRPr/>
-          </a:p>
-        </p:txBody>
-      </p:sp>
-      <p:sp>
-        <p:nvSpPr>
           <p:cNvPr id="14" name="TextBox 13"/>
           <p:cNvSpPr txBox="1"/>
           <p:nvPr/>
         </p:nvSpPr>
         <p:spPr>
           <a:xfrm>
-            <a:off x="4829446" y="3834388"/>
+            <a:off x="4524063" y="4839767"/>
             <a:ext cx="269626" cy="276999"/>
           </a:xfrm>
           <a:prstGeom prst="rect">
@@ -6308,7 +6196,7 @@
         </p:nvSpPr>
         <p:spPr>
           <a:xfrm>
-            <a:off x="3386889" y="3880101"/>
+            <a:off x="3160843" y="4870834"/>
             <a:ext cx="295274" cy="276999"/>
           </a:xfrm>
           <a:prstGeom prst="rect">
@@ -6338,7 +6226,7 @@
         </p:nvSpPr>
         <p:spPr>
           <a:xfrm>
-            <a:off x="7448054" y="2387001"/>
+            <a:off x="6473042" y="4775900"/>
             <a:ext cx="269626" cy="276999"/>
           </a:xfrm>
           <a:prstGeom prst="rect">
@@ -6368,7 +6256,7 @@
         </p:nvSpPr>
         <p:spPr>
           <a:xfrm>
-            <a:off x="5962066" y="2443747"/>
+            <a:off x="5767639" y="5081304"/>
             <a:ext cx="295274" cy="276999"/>
           </a:xfrm>
           <a:prstGeom prst="rect">
@@ -6398,7 +6286,7 @@
         </p:nvSpPr>
         <p:spPr>
           <a:xfrm>
-            <a:off x="3321323" y="4660743"/>
+            <a:off x="3356425" y="5404997"/>
             <a:ext cx="295274" cy="276999"/>
           </a:xfrm>
           <a:prstGeom prst="rect">
@@ -6428,7 +6316,7 @@
         </p:nvSpPr>
         <p:spPr>
           <a:xfrm>
-            <a:off x="4723408" y="4630961"/>
+            <a:off x="4893622" y="5487348"/>
             <a:ext cx="269626" cy="276999"/>
           </a:xfrm>
           <a:prstGeom prst="rect">
@@ -6518,7 +6406,7 @@
         </p:nvSpPr>
         <p:spPr>
           <a:xfrm>
-            <a:off x="2121932" y="3956500"/>
+            <a:off x="1805547" y="5388553"/>
             <a:ext cx="312906" cy="276999"/>
           </a:xfrm>
           <a:prstGeom prst="rect">
@@ -6548,7 +6436,7 @@
         </p:nvSpPr>
         <p:spPr>
           <a:xfrm>
-            <a:off x="1348523" y="3648081"/>
+            <a:off x="1203840" y="5140000"/>
             <a:ext cx="295274" cy="276999"/>
           </a:xfrm>
           <a:prstGeom prst="rect">
@@ -6758,7 +6646,7 @@
         </p:nvSpPr>
         <p:spPr>
           <a:xfrm>
-            <a:off x="7612422" y="4594178"/>
+            <a:off x="7503087" y="5744018"/>
             <a:ext cx="295274" cy="276999"/>
           </a:xfrm>
           <a:prstGeom prst="rect">
@@ -6788,7 +6676,7 @@
         </p:nvSpPr>
         <p:spPr>
           <a:xfrm>
-            <a:off x="6454826" y="4619361"/>
+            <a:off x="6426734" y="5787269"/>
             <a:ext cx="269626" cy="276999"/>
           </a:xfrm>
           <a:prstGeom prst="rect">
@@ -6812,13 +6700,13 @@
       </p:sp>
       <p:sp>
         <p:nvSpPr>
-          <p:cNvPr id="162" name="TextBox 161"/>
+          <p:cNvPr id="163" name="TextBox 162"/>
           <p:cNvSpPr txBox="1"/>
           <p:nvPr/>
         </p:nvSpPr>
         <p:spPr>
           <a:xfrm>
-            <a:off x="6607226" y="4771761"/>
+            <a:off x="8208000" y="4895733"/>
             <a:ext cx="269626" cy="276999"/>
           </a:xfrm>
           <a:prstGeom prst="rect">
@@ -6842,43 +6730,13 @@
       </p:sp>
       <p:sp>
         <p:nvSpPr>
-          <p:cNvPr id="163" name="TextBox 162"/>
-          <p:cNvSpPr txBox="1"/>
-          <p:nvPr/>
-        </p:nvSpPr>
-        <p:spPr>
-          <a:xfrm>
-            <a:off x="8402395" y="3802075"/>
-            <a:ext cx="269626" cy="276999"/>
-          </a:xfrm>
-          <a:prstGeom prst="rect">
-            <a:avLst/>
-          </a:prstGeom>
-          <a:noFill/>
-        </p:spPr>
-        <p:txBody>
-          <a:bodyPr wrap="none" rtlCol="0">
-            <a:spAutoFit/>
-          </a:bodyPr>
-          <a:lstStyle/>
-          <a:p>
-            <a:r>
-              <a:rPr lang="en-US" sz="1200" dirty="0" smtClean="0"/>
-              <a:t>1</a:t>
-            </a:r>
-            <a:endParaRPr lang="en-US" sz="1200" dirty="0"/>
-          </a:p>
-        </p:txBody>
-      </p:sp>
-      <p:sp>
-        <p:nvSpPr>
           <p:cNvPr id="164" name="TextBox 163"/>
           <p:cNvSpPr txBox="1"/>
           <p:nvPr/>
         </p:nvSpPr>
         <p:spPr>
           <a:xfrm>
-            <a:off x="8558963" y="4423520"/>
+            <a:off x="8410783" y="5543532"/>
             <a:ext cx="295274" cy="276999"/>
           </a:xfrm>
           <a:prstGeom prst="rect">
@@ -7021,7 +6879,7 @@
         <p:spPr>
           <a:xfrm>
             <a:off x="3985920" y="2338336"/>
-            <a:ext cx="269626" cy="276999"/>
+            <a:ext cx="295274" cy="276999"/>
           </a:xfrm>
           <a:prstGeom prst="rect">
             <a:avLst/>
@@ -7035,8 +6893,8 @@
           <a:lstStyle/>
           <a:p>
             <a:r>
-              <a:rPr lang="en-US" sz="1200" smtClean="0"/>
-              <a:t>1</a:t>
+              <a:rPr lang="en-US" sz="1200" dirty="0" smtClean="0"/>
+              <a:t>N</a:t>
             </a:r>
             <a:endParaRPr lang="en-US" sz="1200" dirty="0"/>
           </a:p>
@@ -7154,6 +7012,1479 @@
           </a:ln>
         </p:spPr>
       </p:cxnSp>
+      <p:sp>
+        <p:nvSpPr>
+          <p:cNvPr id="234" name="CustomShape 9"/>
+          <p:cNvSpPr/>
+          <p:nvPr/>
+        </p:nvSpPr>
+        <p:spPr>
+          <a:xfrm>
+            <a:off x="375480" y="3222930"/>
+            <a:ext cx="1311480" cy="396720"/>
+          </a:xfrm>
+          <a:prstGeom prst="rect">
+            <a:avLst/>
+          </a:prstGeom>
+          <a:solidFill>
+            <a:srgbClr val="EAEAEA"/>
+          </a:solidFill>
+          <a:ln w="3240">
+            <a:solidFill>
+              <a:srgbClr val="000000"/>
+            </a:solidFill>
+            <a:miter/>
+          </a:ln>
+        </p:spPr>
+        <p:style>
+          <a:lnRef idx="0">
+            <a:scrgbClr r="0" g="0" b="0"/>
+          </a:lnRef>
+          <a:fillRef idx="0">
+            <a:scrgbClr r="0" g="0" b="0"/>
+          </a:fillRef>
+          <a:effectRef idx="0">
+            <a:scrgbClr r="0" g="0" b="0"/>
+          </a:effectRef>
+          <a:fontRef idx="minor"/>
+        </p:style>
+        <p:txBody>
+          <a:bodyPr wrap="none" lIns="90000" tIns="46800" rIns="90000" bIns="46800" anchor="ctr"/>
+          <a:lstStyle/>
+          <a:p>
+            <a:pPr algn="ctr">
+              <a:lnSpc>
+                <a:spcPct val="100000"/>
+              </a:lnSpc>
+            </a:pPr>
+            <a:r>
+              <a:rPr lang="en-US" sz="1400" b="1" dirty="0" smtClean="0">
+                <a:latin typeface="Arial"/>
+              </a:rPr>
+              <a:t>Transaction</a:t>
+            </a:r>
+            <a:endParaRPr dirty="0"/>
+          </a:p>
+        </p:txBody>
+      </p:sp>
+      <p:sp>
+        <p:nvSpPr>
+          <p:cNvPr id="248" name="TextBox 247"/>
+          <p:cNvSpPr txBox="1"/>
+          <p:nvPr/>
+        </p:nvSpPr>
+        <p:spPr>
+          <a:xfrm>
+            <a:off x="904327" y="3855553"/>
+            <a:ext cx="269626" cy="276999"/>
+          </a:xfrm>
+          <a:prstGeom prst="rect">
+            <a:avLst/>
+          </a:prstGeom>
+          <a:noFill/>
+        </p:spPr>
+        <p:txBody>
+          <a:bodyPr wrap="none" rtlCol="0">
+            <a:spAutoFit/>
+          </a:bodyPr>
+          <a:lstStyle/>
+          <a:p>
+            <a:r>
+              <a:rPr lang="en-US" sz="1200" dirty="0" smtClean="0"/>
+              <a:t>d</a:t>
+            </a:r>
+            <a:endParaRPr lang="en-US" sz="1200" dirty="0"/>
+          </a:p>
+        </p:txBody>
+      </p:sp>
+      <p:sp>
+        <p:nvSpPr>
+          <p:cNvPr id="249" name="Oval 248"/>
+          <p:cNvSpPr/>
+          <p:nvPr/>
+        </p:nvSpPr>
+        <p:spPr>
+          <a:xfrm>
+            <a:off x="912775" y="3859164"/>
+            <a:ext cx="236890" cy="243840"/>
+          </a:xfrm>
+          <a:prstGeom prst="ellipse">
+            <a:avLst/>
+          </a:prstGeom>
+          <a:noFill/>
+          <a:ln>
+            <a:solidFill>
+              <a:schemeClr val="tx1"/>
+            </a:solidFill>
+          </a:ln>
+        </p:spPr>
+        <p:style>
+          <a:lnRef idx="2">
+            <a:schemeClr val="accent1">
+              <a:shade val="50000"/>
+            </a:schemeClr>
+          </a:lnRef>
+          <a:fillRef idx="1">
+            <a:schemeClr val="accent1"/>
+          </a:fillRef>
+          <a:effectRef idx="0">
+            <a:schemeClr val="accent1"/>
+          </a:effectRef>
+          <a:fontRef idx="minor">
+            <a:schemeClr val="lt1"/>
+          </a:fontRef>
+        </p:style>
+        <p:txBody>
+          <a:bodyPr rtlCol="0" anchor="ctr"/>
+          <a:lstStyle/>
+          <a:p>
+            <a:pPr algn="ctr"/>
+            <a:endParaRPr lang="en-US"/>
+          </a:p>
+        </p:txBody>
+      </p:sp>
+      <p:sp>
+        <p:nvSpPr>
+          <p:cNvPr id="252" name="Line 2"/>
+          <p:cNvSpPr/>
+          <p:nvPr/>
+        </p:nvSpPr>
+        <p:spPr>
+          <a:xfrm>
+            <a:off x="1018532" y="3619119"/>
+            <a:ext cx="12688" cy="237348"/>
+          </a:xfrm>
+          <a:prstGeom prst="line">
+            <a:avLst/>
+          </a:prstGeom>
+          <a:ln w="38160">
+            <a:solidFill>
+              <a:srgbClr val="000000"/>
+            </a:solidFill>
+            <a:miter/>
+          </a:ln>
+        </p:spPr>
+      </p:sp>
+      <p:cxnSp>
+        <p:nvCxnSpPr>
+          <p:cNvPr id="253" name="Line 85"/>
+          <p:cNvCxnSpPr>
+            <a:stCxn id="249" idx="4"/>
+            <a:endCxn id="49" idx="0"/>
+          </p:cNvCxnSpPr>
+          <p:nvPr/>
+        </p:nvCxnSpPr>
+        <p:spPr>
+          <a:xfrm rot="5400000">
+            <a:off x="772769" y="4348767"/>
+            <a:ext cx="504215" cy="12688"/>
+          </a:xfrm>
+          <a:prstGeom prst="bentConnector3">
+            <a:avLst>
+              <a:gd name="adj1" fmla="val 50000"/>
+            </a:avLst>
+          </a:prstGeom>
+          <a:ln w="9360">
+            <a:solidFill>
+              <a:srgbClr val="000000"/>
+            </a:solidFill>
+            <a:round/>
+          </a:ln>
+        </p:spPr>
+      </p:cxnSp>
+      <p:sp>
+        <p:nvSpPr>
+          <p:cNvPr id="261" name="TextBox 260"/>
+          <p:cNvSpPr txBox="1"/>
+          <p:nvPr/>
+        </p:nvSpPr>
+        <p:spPr>
+          <a:xfrm>
+            <a:off x="876891" y="4172110"/>
+            <a:ext cx="332142" cy="338554"/>
+          </a:xfrm>
+          <a:prstGeom prst="rect">
+            <a:avLst/>
+          </a:prstGeom>
+          <a:noFill/>
+        </p:spPr>
+        <p:txBody>
+          <a:bodyPr wrap="none" rtlCol="0">
+            <a:spAutoFit/>
+          </a:bodyPr>
+          <a:lstStyle/>
+          <a:p>
+            <a:r>
+              <a:rPr lang="en-US" sz="1600" dirty="0" smtClean="0"/>
+              <a:t>U</a:t>
+            </a:r>
+            <a:endParaRPr lang="en-US" sz="1600" dirty="0"/>
+          </a:p>
+        </p:txBody>
+      </p:sp>
+      <p:sp>
+        <p:nvSpPr>
+          <p:cNvPr id="262" name="CustomShape 9"/>
+          <p:cNvSpPr/>
+          <p:nvPr/>
+        </p:nvSpPr>
+        <p:spPr>
+          <a:xfrm>
+            <a:off x="1971318" y="4676321"/>
+            <a:ext cx="1016192" cy="354743"/>
+          </a:xfrm>
+          <a:prstGeom prst="rect">
+            <a:avLst/>
+          </a:prstGeom>
+          <a:solidFill>
+            <a:srgbClr val="EAEAEA"/>
+          </a:solidFill>
+          <a:ln w="3240">
+            <a:solidFill>
+              <a:srgbClr val="000000"/>
+            </a:solidFill>
+            <a:miter/>
+          </a:ln>
+        </p:spPr>
+        <p:style>
+          <a:lnRef idx="0">
+            <a:scrgbClr r="0" g="0" b="0"/>
+          </a:lnRef>
+          <a:fillRef idx="0">
+            <a:scrgbClr r="0" g="0" b="0"/>
+          </a:fillRef>
+          <a:effectRef idx="0">
+            <a:scrgbClr r="0" g="0" b="0"/>
+          </a:effectRef>
+          <a:fontRef idx="minor"/>
+        </p:style>
+        <p:txBody>
+          <a:bodyPr wrap="none" lIns="90000" tIns="46800" rIns="90000" bIns="46800" anchor="ctr"/>
+          <a:lstStyle/>
+          <a:p>
+            <a:pPr algn="ctr">
+              <a:lnSpc>
+                <a:spcPct val="100000"/>
+              </a:lnSpc>
+            </a:pPr>
+            <a:r>
+              <a:rPr lang="en-US" sz="1400" b="1" dirty="0" smtClean="0">
+                <a:latin typeface="Arial"/>
+              </a:rPr>
+              <a:t>Withdrawal</a:t>
+            </a:r>
+            <a:endParaRPr dirty="0"/>
+          </a:p>
+        </p:txBody>
+      </p:sp>
+      <p:sp>
+        <p:nvSpPr>
+          <p:cNvPr id="263" name="CustomShape 9"/>
+          <p:cNvSpPr/>
+          <p:nvPr/>
+        </p:nvSpPr>
+        <p:spPr>
+          <a:xfrm>
+            <a:off x="2007746" y="4287975"/>
+            <a:ext cx="903076" cy="320846"/>
+          </a:xfrm>
+          <a:prstGeom prst="rect">
+            <a:avLst/>
+          </a:prstGeom>
+          <a:solidFill>
+            <a:srgbClr val="EAEAEA"/>
+          </a:solidFill>
+          <a:ln w="3240">
+            <a:solidFill>
+              <a:srgbClr val="000000"/>
+            </a:solidFill>
+            <a:miter/>
+          </a:ln>
+        </p:spPr>
+        <p:style>
+          <a:lnRef idx="0">
+            <a:scrgbClr r="0" g="0" b="0"/>
+          </a:lnRef>
+          <a:fillRef idx="0">
+            <a:scrgbClr r="0" g="0" b="0"/>
+          </a:fillRef>
+          <a:effectRef idx="0">
+            <a:scrgbClr r="0" g="0" b="0"/>
+          </a:effectRef>
+          <a:fontRef idx="minor"/>
+        </p:style>
+        <p:txBody>
+          <a:bodyPr wrap="none" lIns="90000" tIns="46800" rIns="90000" bIns="46800" anchor="ctr"/>
+          <a:lstStyle/>
+          <a:p>
+            <a:pPr algn="ctr">
+              <a:lnSpc>
+                <a:spcPct val="100000"/>
+              </a:lnSpc>
+            </a:pPr>
+            <a:r>
+              <a:rPr lang="en-US" sz="1400" b="1">
+                <a:latin typeface="Arial"/>
+              </a:rPr>
+              <a:t>Debit</a:t>
+            </a:r>
+            <a:endParaRPr/>
+          </a:p>
+        </p:txBody>
+      </p:sp>
+      <p:cxnSp>
+        <p:nvCxnSpPr>
+          <p:cNvPr id="265" name="Line 85"/>
+          <p:cNvCxnSpPr>
+            <a:stCxn id="248" idx="3"/>
+            <a:endCxn id="263" idx="1"/>
+          </p:cNvCxnSpPr>
+          <p:nvPr/>
+        </p:nvCxnSpPr>
+        <p:spPr>
+          <a:xfrm>
+            <a:off x="1173953" y="3994053"/>
+            <a:ext cx="833793" cy="454345"/>
+          </a:xfrm>
+          <a:prstGeom prst="bentConnector3">
+            <a:avLst>
+              <a:gd name="adj1" fmla="val 50000"/>
+            </a:avLst>
+          </a:prstGeom>
+          <a:ln w="9360">
+            <a:solidFill>
+              <a:srgbClr val="000000"/>
+            </a:solidFill>
+            <a:round/>
+          </a:ln>
+        </p:spPr>
+      </p:cxnSp>
+      <p:cxnSp>
+        <p:nvCxnSpPr>
+          <p:cNvPr id="268" name="Line 85"/>
+          <p:cNvCxnSpPr>
+            <a:stCxn id="248" idx="3"/>
+            <a:endCxn id="262" idx="1"/>
+          </p:cNvCxnSpPr>
+          <p:nvPr/>
+        </p:nvCxnSpPr>
+        <p:spPr>
+          <a:xfrm>
+            <a:off x="1173953" y="3994053"/>
+            <a:ext cx="797365" cy="859640"/>
+          </a:xfrm>
+          <a:prstGeom prst="bentConnector3">
+            <a:avLst>
+              <a:gd name="adj1" fmla="val 73645"/>
+            </a:avLst>
+          </a:prstGeom>
+          <a:ln w="9360">
+            <a:solidFill>
+              <a:srgbClr val="000000"/>
+            </a:solidFill>
+            <a:round/>
+          </a:ln>
+        </p:spPr>
+      </p:cxnSp>
+      <p:sp>
+        <p:nvSpPr>
+          <p:cNvPr id="271" name="CustomShape 31"/>
+          <p:cNvSpPr/>
+          <p:nvPr/>
+        </p:nvSpPr>
+        <p:spPr>
+          <a:xfrm>
+            <a:off x="3037077" y="4126764"/>
+            <a:ext cx="838080" cy="304920"/>
+          </a:xfrm>
+          <a:prstGeom prst="ellipse">
+            <a:avLst/>
+          </a:prstGeom>
+          <a:solidFill>
+            <a:srgbClr val="FFFFFF"/>
+          </a:solidFill>
+          <a:ln w="3240">
+            <a:solidFill>
+              <a:srgbClr val="000000"/>
+            </a:solidFill>
+            <a:miter/>
+          </a:ln>
+        </p:spPr>
+        <p:style>
+          <a:lnRef idx="0">
+            <a:scrgbClr r="0" g="0" b="0"/>
+          </a:lnRef>
+          <a:fillRef idx="0">
+            <a:scrgbClr r="0" g="0" b="0"/>
+          </a:fillRef>
+          <a:effectRef idx="0">
+            <a:scrgbClr r="0" g="0" b="0"/>
+          </a:effectRef>
+          <a:fontRef idx="minor"/>
+        </p:style>
+        <p:txBody>
+          <a:bodyPr wrap="none" lIns="90000" tIns="46800" rIns="90000" bIns="46800" anchor="ctr"/>
+          <a:lstStyle/>
+          <a:p>
+            <a:pPr algn="ctr">
+              <a:lnSpc>
+                <a:spcPct val="100000"/>
+              </a:lnSpc>
+            </a:pPr>
+            <a:r>
+              <a:rPr lang="en-US" sz="1200" dirty="0" smtClean="0">
+                <a:latin typeface="Arial"/>
+              </a:rPr>
+              <a:t>amount</a:t>
+            </a:r>
+            <a:endParaRPr dirty="0"/>
+          </a:p>
+        </p:txBody>
+      </p:sp>
+      <p:cxnSp>
+        <p:nvCxnSpPr>
+          <p:cNvPr id="272" name="Line 51"/>
+          <p:cNvCxnSpPr>
+            <a:stCxn id="263" idx="3"/>
+            <a:endCxn id="271" idx="2"/>
+          </p:cNvCxnSpPr>
+          <p:nvPr/>
+        </p:nvCxnSpPr>
+        <p:spPr>
+          <a:xfrm flipV="1">
+            <a:off x="2910822" y="4279224"/>
+            <a:ext cx="126255" cy="169174"/>
+          </a:xfrm>
+          <a:prstGeom prst="bentConnector3">
+            <a:avLst>
+              <a:gd name="adj1" fmla="val 50000"/>
+            </a:avLst>
+          </a:prstGeom>
+          <a:ln w="9360">
+            <a:solidFill>
+              <a:srgbClr val="000000"/>
+            </a:solidFill>
+            <a:round/>
+          </a:ln>
+        </p:spPr>
+      </p:cxnSp>
+      <p:sp>
+        <p:nvSpPr>
+          <p:cNvPr id="275" name="CustomShape 31"/>
+          <p:cNvSpPr/>
+          <p:nvPr/>
+        </p:nvSpPr>
+        <p:spPr>
+          <a:xfrm>
+            <a:off x="3060433" y="4459856"/>
+            <a:ext cx="838080" cy="304920"/>
+          </a:xfrm>
+          <a:prstGeom prst="ellipse">
+            <a:avLst/>
+          </a:prstGeom>
+          <a:solidFill>
+            <a:srgbClr val="FFFFFF"/>
+          </a:solidFill>
+          <a:ln w="3240">
+            <a:solidFill>
+              <a:srgbClr val="000000"/>
+            </a:solidFill>
+            <a:miter/>
+          </a:ln>
+        </p:spPr>
+        <p:style>
+          <a:lnRef idx="0">
+            <a:scrgbClr r="0" g="0" b="0"/>
+          </a:lnRef>
+          <a:fillRef idx="0">
+            <a:scrgbClr r="0" g="0" b="0"/>
+          </a:fillRef>
+          <a:effectRef idx="0">
+            <a:scrgbClr r="0" g="0" b="0"/>
+          </a:effectRef>
+          <a:fontRef idx="minor"/>
+        </p:style>
+        <p:txBody>
+          <a:bodyPr wrap="none" lIns="90000" tIns="46800" rIns="90000" bIns="46800" anchor="ctr"/>
+          <a:lstStyle/>
+          <a:p>
+            <a:pPr algn="ctr">
+              <a:lnSpc>
+                <a:spcPct val="100000"/>
+              </a:lnSpc>
+            </a:pPr>
+            <a:r>
+              <a:rPr lang="en-US" sz="1200" dirty="0" smtClean="0">
+                <a:latin typeface="Arial"/>
+              </a:rPr>
+              <a:t>amount</a:t>
+            </a:r>
+            <a:endParaRPr dirty="0"/>
+          </a:p>
+        </p:txBody>
+      </p:sp>
+      <p:cxnSp>
+        <p:nvCxnSpPr>
+          <p:cNvPr id="276" name="Line 51"/>
+          <p:cNvCxnSpPr>
+            <a:stCxn id="275" idx="2"/>
+            <a:endCxn id="262" idx="3"/>
+          </p:cNvCxnSpPr>
+          <p:nvPr/>
+        </p:nvCxnSpPr>
+        <p:spPr>
+          <a:xfrm rot="10800000" flipV="1">
+            <a:off x="2987511" y="4612315"/>
+            <a:ext cx="72923" cy="241377"/>
+          </a:xfrm>
+          <a:prstGeom prst="bentConnector3">
+            <a:avLst>
+              <a:gd name="adj1" fmla="val 50000"/>
+            </a:avLst>
+          </a:prstGeom>
+          <a:ln w="9360">
+            <a:solidFill>
+              <a:srgbClr val="000000"/>
+            </a:solidFill>
+            <a:round/>
+          </a:ln>
+        </p:spPr>
+      </p:cxnSp>
+      <p:sp>
+        <p:nvSpPr>
+          <p:cNvPr id="283" name="CustomShape 8"/>
+          <p:cNvSpPr/>
+          <p:nvPr/>
+        </p:nvSpPr>
+        <p:spPr>
+          <a:xfrm>
+            <a:off x="5596200" y="2702996"/>
+            <a:ext cx="1311480" cy="397080"/>
+          </a:xfrm>
+          <a:prstGeom prst="rect">
+            <a:avLst/>
+          </a:prstGeom>
+          <a:solidFill>
+            <a:srgbClr val="EAEAEA"/>
+          </a:solidFill>
+          <a:ln w="3240">
+            <a:solidFill>
+              <a:srgbClr val="000000"/>
+            </a:solidFill>
+            <a:miter/>
+          </a:ln>
+        </p:spPr>
+        <p:style>
+          <a:lnRef idx="0">
+            <a:scrgbClr r="0" g="0" b="0"/>
+          </a:lnRef>
+          <a:fillRef idx="0">
+            <a:scrgbClr r="0" g="0" b="0"/>
+          </a:fillRef>
+          <a:effectRef idx="0">
+            <a:scrgbClr r="0" g="0" b="0"/>
+          </a:effectRef>
+          <a:fontRef idx="minor"/>
+        </p:style>
+        <p:txBody>
+          <a:bodyPr wrap="none" lIns="90000" tIns="46800" rIns="90000" bIns="46800" anchor="ctr"/>
+          <a:lstStyle/>
+          <a:p>
+            <a:pPr algn="ctr">
+              <a:lnSpc>
+                <a:spcPct val="100000"/>
+              </a:lnSpc>
+            </a:pPr>
+            <a:r>
+              <a:rPr lang="en-US" sz="1400" b="1" dirty="0" smtClean="0">
+                <a:latin typeface="Arial"/>
+              </a:rPr>
+              <a:t>Customer</a:t>
+            </a:r>
+          </a:p>
+        </p:txBody>
+      </p:sp>
+      <p:sp>
+        <p:nvSpPr>
+          <p:cNvPr id="284" name="CustomShape 95"/>
+          <p:cNvSpPr/>
+          <p:nvPr/>
+        </p:nvSpPr>
+        <p:spPr>
+          <a:xfrm>
+            <a:off x="6366373" y="3202920"/>
+            <a:ext cx="838080" cy="304560"/>
+          </a:xfrm>
+          <a:prstGeom prst="ellipse">
+            <a:avLst/>
+          </a:prstGeom>
+          <a:solidFill>
+            <a:srgbClr val="FFFFFF"/>
+          </a:solidFill>
+          <a:ln w="3240">
+            <a:solidFill>
+              <a:srgbClr val="000000"/>
+            </a:solidFill>
+            <a:miter/>
+          </a:ln>
+        </p:spPr>
+        <p:style>
+          <a:lnRef idx="0">
+            <a:scrgbClr r="0" g="0" b="0"/>
+          </a:lnRef>
+          <a:fillRef idx="0">
+            <a:scrgbClr r="0" g="0" b="0"/>
+          </a:fillRef>
+          <a:effectRef idx="0">
+            <a:scrgbClr r="0" g="0" b="0"/>
+          </a:effectRef>
+          <a:fontRef idx="minor"/>
+        </p:style>
+        <p:txBody>
+          <a:bodyPr wrap="none" lIns="90000" tIns="46800" rIns="90000" bIns="46800" anchor="ctr"/>
+          <a:lstStyle/>
+          <a:p>
+            <a:pPr algn="ctr">
+              <a:lnSpc>
+                <a:spcPct val="100000"/>
+              </a:lnSpc>
+            </a:pPr>
+            <a:r>
+              <a:rPr lang="en-US" sz="1200" dirty="0" smtClean="0">
+                <a:latin typeface="Arial"/>
+              </a:rPr>
+              <a:t>name</a:t>
+            </a:r>
+            <a:endParaRPr dirty="0"/>
+          </a:p>
+        </p:txBody>
+      </p:sp>
+      <p:cxnSp>
+        <p:nvCxnSpPr>
+          <p:cNvPr id="285" name="Line 81"/>
+          <p:cNvCxnSpPr>
+            <a:stCxn id="284" idx="2"/>
+            <a:endCxn id="283" idx="2"/>
+          </p:cNvCxnSpPr>
+          <p:nvPr/>
+        </p:nvCxnSpPr>
+        <p:spPr>
+          <a:xfrm rot="10800000">
+            <a:off x="6251941" y="3100076"/>
+            <a:ext cx="114433" cy="255124"/>
+          </a:xfrm>
+          <a:prstGeom prst="bentConnector2">
+            <a:avLst/>
+          </a:prstGeom>
+          <a:ln w="9360">
+            <a:solidFill>
+              <a:srgbClr val="000000"/>
+            </a:solidFill>
+            <a:round/>
+          </a:ln>
+        </p:spPr>
+      </p:cxnSp>
+      <p:sp>
+        <p:nvSpPr>
+          <p:cNvPr id="289" name="CustomShape 95"/>
+          <p:cNvSpPr/>
+          <p:nvPr/>
+        </p:nvSpPr>
+        <p:spPr>
+          <a:xfrm>
+            <a:off x="6992445" y="2864917"/>
+            <a:ext cx="838080" cy="304560"/>
+          </a:xfrm>
+          <a:prstGeom prst="ellipse">
+            <a:avLst/>
+          </a:prstGeom>
+          <a:solidFill>
+            <a:srgbClr val="FFFFFF"/>
+          </a:solidFill>
+          <a:ln w="3240">
+            <a:solidFill>
+              <a:srgbClr val="000000"/>
+            </a:solidFill>
+            <a:miter/>
+          </a:ln>
+        </p:spPr>
+        <p:style>
+          <a:lnRef idx="0">
+            <a:scrgbClr r="0" g="0" b="0"/>
+          </a:lnRef>
+          <a:fillRef idx="0">
+            <a:scrgbClr r="0" g="0" b="0"/>
+          </a:fillRef>
+          <a:effectRef idx="0">
+            <a:scrgbClr r="0" g="0" b="0"/>
+          </a:effectRef>
+          <a:fontRef idx="minor"/>
+        </p:style>
+        <p:txBody>
+          <a:bodyPr wrap="none" lIns="90000" tIns="46800" rIns="90000" bIns="46800" anchor="ctr"/>
+          <a:lstStyle/>
+          <a:p>
+            <a:pPr algn="ctr">
+              <a:lnSpc>
+                <a:spcPct val="100000"/>
+              </a:lnSpc>
+            </a:pPr>
+            <a:r>
+              <a:rPr lang="en-US" sz="1200" dirty="0" smtClean="0">
+                <a:latin typeface="Arial"/>
+              </a:rPr>
+              <a:t>address</a:t>
+            </a:r>
+            <a:endParaRPr dirty="0"/>
+          </a:p>
+        </p:txBody>
+      </p:sp>
+      <p:cxnSp>
+        <p:nvCxnSpPr>
+          <p:cNvPr id="290" name="Line 81"/>
+          <p:cNvCxnSpPr>
+            <a:stCxn id="289" idx="2"/>
+            <a:endCxn id="283" idx="3"/>
+          </p:cNvCxnSpPr>
+          <p:nvPr/>
+        </p:nvCxnSpPr>
+        <p:spPr>
+          <a:xfrm rot="10800000">
+            <a:off x="6907681" y="2901537"/>
+            <a:ext cx="84765" cy="115661"/>
+          </a:xfrm>
+          <a:prstGeom prst="bentConnector3">
+            <a:avLst>
+              <a:gd name="adj1" fmla="val 50000"/>
+            </a:avLst>
+          </a:prstGeom>
+          <a:ln w="9360">
+            <a:solidFill>
+              <a:srgbClr val="000000"/>
+            </a:solidFill>
+            <a:round/>
+          </a:ln>
+        </p:spPr>
+      </p:cxnSp>
+      <p:sp>
+        <p:nvSpPr>
+          <p:cNvPr id="293" name="CustomShape 14"/>
+          <p:cNvSpPr/>
+          <p:nvPr/>
+        </p:nvSpPr>
+        <p:spPr>
+          <a:xfrm>
+            <a:off x="8370406" y="2359391"/>
+            <a:ext cx="1295640" cy="609480"/>
+          </a:xfrm>
+          <a:prstGeom prst="diamond">
+            <a:avLst/>
+          </a:prstGeom>
+          <a:noFill/>
+          <a:ln w="3240">
+            <a:solidFill>
+              <a:srgbClr val="000000"/>
+            </a:solidFill>
+            <a:miter/>
+          </a:ln>
+        </p:spPr>
+        <p:style>
+          <a:lnRef idx="0">
+            <a:scrgbClr r="0" g="0" b="0"/>
+          </a:lnRef>
+          <a:fillRef idx="0">
+            <a:scrgbClr r="0" g="0" b="0"/>
+          </a:fillRef>
+          <a:effectRef idx="0">
+            <a:scrgbClr r="0" g="0" b="0"/>
+          </a:effectRef>
+          <a:fontRef idx="minor"/>
+        </p:style>
+        <p:txBody>
+          <a:bodyPr wrap="none" lIns="90000" tIns="46800" rIns="90000" bIns="46800" anchor="ctr"/>
+          <a:lstStyle/>
+          <a:p>
+            <a:pPr algn="ctr">
+              <a:lnSpc>
+                <a:spcPct val="100000"/>
+              </a:lnSpc>
+            </a:pPr>
+            <a:r>
+              <a:rPr lang="en-US" sz="1200" b="1" dirty="0" smtClean="0">
+                <a:latin typeface="Arial"/>
+              </a:rPr>
+              <a:t>living in</a:t>
+            </a:r>
+            <a:endParaRPr dirty="0"/>
+          </a:p>
+        </p:txBody>
+      </p:sp>
+      <p:cxnSp>
+        <p:nvCxnSpPr>
+          <p:cNvPr id="294" name="Line 83"/>
+          <p:cNvCxnSpPr>
+            <a:stCxn id="293" idx="1"/>
+            <a:endCxn id="283" idx="3"/>
+          </p:cNvCxnSpPr>
+          <p:nvPr/>
+        </p:nvCxnSpPr>
+        <p:spPr>
+          <a:xfrm rot="10800000" flipV="1">
+            <a:off x="6907680" y="2664130"/>
+            <a:ext cx="1462726" cy="237405"/>
+          </a:xfrm>
+          <a:prstGeom prst="bentConnector3">
+            <a:avLst>
+              <a:gd name="adj1" fmla="val 90601"/>
+            </a:avLst>
+          </a:prstGeom>
+          <a:ln w="9360">
+            <a:solidFill>
+              <a:srgbClr val="000000"/>
+            </a:solidFill>
+            <a:round/>
+          </a:ln>
+        </p:spPr>
+      </p:cxnSp>
+      <p:cxnSp>
+        <p:nvCxnSpPr>
+          <p:cNvPr id="298" name="Line 83"/>
+          <p:cNvCxnSpPr>
+            <a:stCxn id="47" idx="2"/>
+            <a:endCxn id="293" idx="0"/>
+          </p:cNvCxnSpPr>
+          <p:nvPr/>
+        </p:nvCxnSpPr>
+        <p:spPr>
+          <a:xfrm rot="16200000" flipH="1">
+            <a:off x="8122008" y="1463172"/>
+            <a:ext cx="902471" cy="889966"/>
+          </a:xfrm>
+          <a:prstGeom prst="bentConnector3">
+            <a:avLst>
+              <a:gd name="adj1" fmla="val 50000"/>
+            </a:avLst>
+          </a:prstGeom>
+          <a:ln w="9360">
+            <a:solidFill>
+              <a:srgbClr val="000000"/>
+            </a:solidFill>
+            <a:round/>
+          </a:ln>
+        </p:spPr>
+      </p:cxnSp>
+      <p:sp>
+        <p:nvSpPr>
+          <p:cNvPr id="302" name="TextBox 301"/>
+          <p:cNvSpPr txBox="1"/>
+          <p:nvPr/>
+        </p:nvSpPr>
+        <p:spPr>
+          <a:xfrm>
+            <a:off x="8155213" y="2678653"/>
+            <a:ext cx="295274" cy="276999"/>
+          </a:xfrm>
+          <a:prstGeom prst="rect">
+            <a:avLst/>
+          </a:prstGeom>
+          <a:noFill/>
+        </p:spPr>
+        <p:txBody>
+          <a:bodyPr wrap="none" rtlCol="0">
+            <a:spAutoFit/>
+          </a:bodyPr>
+          <a:lstStyle/>
+          <a:p>
+            <a:r>
+              <a:rPr lang="en-US" sz="1200" dirty="0" smtClean="0"/>
+              <a:t>N</a:t>
+            </a:r>
+            <a:endParaRPr lang="en-US" sz="1200" dirty="0"/>
+          </a:p>
+        </p:txBody>
+      </p:sp>
+      <p:sp>
+        <p:nvSpPr>
+          <p:cNvPr id="303" name="TextBox 302"/>
+          <p:cNvSpPr txBox="1"/>
+          <p:nvPr/>
+        </p:nvSpPr>
+        <p:spPr>
+          <a:xfrm>
+            <a:off x="8985197" y="2103954"/>
+            <a:ext cx="269626" cy="276999"/>
+          </a:xfrm>
+          <a:prstGeom prst="rect">
+            <a:avLst/>
+          </a:prstGeom>
+          <a:noFill/>
+        </p:spPr>
+        <p:txBody>
+          <a:bodyPr wrap="none" rtlCol="0">
+            <a:spAutoFit/>
+          </a:bodyPr>
+          <a:lstStyle/>
+          <a:p>
+            <a:r>
+              <a:rPr lang="en-US" sz="1200" dirty="0" smtClean="0"/>
+              <a:t>1</a:t>
+            </a:r>
+            <a:endParaRPr lang="en-US" sz="1200" dirty="0"/>
+          </a:p>
+        </p:txBody>
+      </p:sp>
+      <p:sp>
+        <p:nvSpPr>
+          <p:cNvPr id="304" name="CustomShape 8"/>
+          <p:cNvSpPr/>
+          <p:nvPr/>
+        </p:nvSpPr>
+        <p:spPr>
+          <a:xfrm>
+            <a:off x="3861394" y="3622772"/>
+            <a:ext cx="1311480" cy="397080"/>
+          </a:xfrm>
+          <a:prstGeom prst="rect">
+            <a:avLst/>
+          </a:prstGeom>
+          <a:solidFill>
+            <a:srgbClr val="EAEAEA"/>
+          </a:solidFill>
+          <a:ln w="3240">
+            <a:solidFill>
+              <a:srgbClr val="000000"/>
+            </a:solidFill>
+            <a:miter/>
+          </a:ln>
+        </p:spPr>
+        <p:style>
+          <a:lnRef idx="0">
+            <a:scrgbClr r="0" g="0" b="0"/>
+          </a:lnRef>
+          <a:fillRef idx="0">
+            <a:scrgbClr r="0" g="0" b="0"/>
+          </a:fillRef>
+          <a:effectRef idx="0">
+            <a:scrgbClr r="0" g="0" b="0"/>
+          </a:effectRef>
+          <a:fontRef idx="minor"/>
+        </p:style>
+        <p:txBody>
+          <a:bodyPr wrap="none" lIns="90000" tIns="46800" rIns="90000" bIns="46800" anchor="ctr"/>
+          <a:lstStyle/>
+          <a:p>
+            <a:pPr algn="ctr">
+              <a:lnSpc>
+                <a:spcPct val="100000"/>
+              </a:lnSpc>
+            </a:pPr>
+            <a:r>
+              <a:rPr lang="en-US" sz="1400" b="1" dirty="0" smtClean="0">
+                <a:latin typeface="Arial"/>
+              </a:rPr>
+              <a:t>Account</a:t>
+            </a:r>
+          </a:p>
+        </p:txBody>
+      </p:sp>
+      <p:sp>
+        <p:nvSpPr>
+          <p:cNvPr id="316" name="CustomShape 14"/>
+          <p:cNvSpPr/>
+          <p:nvPr/>
+        </p:nvSpPr>
+        <p:spPr>
+          <a:xfrm>
+            <a:off x="5690928" y="3572420"/>
+            <a:ext cx="1295640" cy="609480"/>
+          </a:xfrm>
+          <a:prstGeom prst="diamond">
+            <a:avLst/>
+          </a:prstGeom>
+          <a:noFill/>
+          <a:ln w="3240">
+            <a:solidFill>
+              <a:srgbClr val="000000"/>
+            </a:solidFill>
+            <a:miter/>
+          </a:ln>
+        </p:spPr>
+        <p:style>
+          <a:lnRef idx="0">
+            <a:scrgbClr r="0" g="0" b="0"/>
+          </a:lnRef>
+          <a:fillRef idx="0">
+            <a:scrgbClr r="0" g="0" b="0"/>
+          </a:fillRef>
+          <a:effectRef idx="0">
+            <a:scrgbClr r="0" g="0" b="0"/>
+          </a:effectRef>
+          <a:fontRef idx="minor"/>
+        </p:style>
+        <p:txBody>
+          <a:bodyPr wrap="none" lIns="90000" tIns="46800" rIns="90000" bIns="46800" anchor="ctr"/>
+          <a:lstStyle/>
+          <a:p>
+            <a:pPr algn="ctr">
+              <a:lnSpc>
+                <a:spcPct val="100000"/>
+              </a:lnSpc>
+            </a:pPr>
+            <a:r>
+              <a:rPr lang="en-US" sz="1200" b="1" dirty="0" smtClean="0">
+                <a:latin typeface="Arial"/>
+              </a:rPr>
+              <a:t>owns</a:t>
+            </a:r>
+            <a:endParaRPr dirty="0"/>
+          </a:p>
+        </p:txBody>
+      </p:sp>
+      <p:cxnSp>
+        <p:nvCxnSpPr>
+          <p:cNvPr id="317" name="Line 83"/>
+          <p:cNvCxnSpPr>
+            <a:stCxn id="316" idx="1"/>
+            <a:endCxn id="304" idx="3"/>
+          </p:cNvCxnSpPr>
+          <p:nvPr/>
+        </p:nvCxnSpPr>
+        <p:spPr>
+          <a:xfrm rot="10800000">
+            <a:off x="5172874" y="3821312"/>
+            <a:ext cx="518054" cy="55848"/>
+          </a:xfrm>
+          <a:prstGeom prst="bentConnector3">
+            <a:avLst>
+              <a:gd name="adj1" fmla="val 50000"/>
+            </a:avLst>
+          </a:prstGeom>
+          <a:ln w="9360">
+            <a:solidFill>
+              <a:srgbClr val="000000"/>
+            </a:solidFill>
+            <a:round/>
+          </a:ln>
+        </p:spPr>
+      </p:cxnSp>
+      <p:cxnSp>
+        <p:nvCxnSpPr>
+          <p:cNvPr id="320" name="Line 83"/>
+          <p:cNvCxnSpPr>
+            <a:stCxn id="316" idx="0"/>
+            <a:endCxn id="283" idx="2"/>
+          </p:cNvCxnSpPr>
+          <p:nvPr/>
+        </p:nvCxnSpPr>
+        <p:spPr>
+          <a:xfrm rot="16200000" flipV="1">
+            <a:off x="6059172" y="3292844"/>
+            <a:ext cx="472344" cy="86808"/>
+          </a:xfrm>
+          <a:prstGeom prst="bentConnector3">
+            <a:avLst>
+              <a:gd name="adj1" fmla="val 50000"/>
+            </a:avLst>
+          </a:prstGeom>
+          <a:ln w="9360">
+            <a:solidFill>
+              <a:srgbClr val="000000"/>
+            </a:solidFill>
+            <a:round/>
+          </a:ln>
+        </p:spPr>
+      </p:cxnSp>
+      <p:sp>
+        <p:nvSpPr>
+          <p:cNvPr id="326" name="CustomShape 95"/>
+          <p:cNvSpPr/>
+          <p:nvPr/>
+        </p:nvSpPr>
+        <p:spPr>
+          <a:xfrm>
+            <a:off x="4172340" y="3200195"/>
+            <a:ext cx="838080" cy="304560"/>
+          </a:xfrm>
+          <a:prstGeom prst="ellipse">
+            <a:avLst/>
+          </a:prstGeom>
+          <a:solidFill>
+            <a:srgbClr val="FFFFFF"/>
+          </a:solidFill>
+          <a:ln w="3240">
+            <a:solidFill>
+              <a:srgbClr val="000000"/>
+            </a:solidFill>
+            <a:miter/>
+          </a:ln>
+        </p:spPr>
+        <p:style>
+          <a:lnRef idx="0">
+            <a:scrgbClr r="0" g="0" b="0"/>
+          </a:lnRef>
+          <a:fillRef idx="0">
+            <a:scrgbClr r="0" g="0" b="0"/>
+          </a:fillRef>
+          <a:effectRef idx="0">
+            <a:scrgbClr r="0" g="0" b="0"/>
+          </a:effectRef>
+          <a:fontRef idx="minor"/>
+        </p:style>
+        <p:txBody>
+          <a:bodyPr wrap="none" lIns="90000" tIns="46800" rIns="90000" bIns="46800" anchor="ctr"/>
+          <a:lstStyle/>
+          <a:p>
+            <a:pPr algn="ctr">
+              <a:lnSpc>
+                <a:spcPct val="100000"/>
+              </a:lnSpc>
+            </a:pPr>
+            <a:r>
+              <a:rPr lang="en-US" sz="1200" dirty="0" smtClean="0">
+                <a:latin typeface="Arial"/>
+              </a:rPr>
+              <a:t>balance</a:t>
+            </a:r>
+            <a:endParaRPr dirty="0"/>
+          </a:p>
+        </p:txBody>
+      </p:sp>
+      <p:cxnSp>
+        <p:nvCxnSpPr>
+          <p:cNvPr id="327" name="Line 83"/>
+          <p:cNvCxnSpPr>
+            <a:stCxn id="304" idx="0"/>
+            <a:endCxn id="326" idx="4"/>
+          </p:cNvCxnSpPr>
+          <p:nvPr/>
+        </p:nvCxnSpPr>
+        <p:spPr>
+          <a:xfrm rot="5400000" flipH="1" flipV="1">
+            <a:off x="4495249" y="3526641"/>
+            <a:ext cx="118017" cy="74246"/>
+          </a:xfrm>
+          <a:prstGeom prst="bentConnector3">
+            <a:avLst>
+              <a:gd name="adj1" fmla="val 50000"/>
+            </a:avLst>
+          </a:prstGeom>
+          <a:ln w="9360">
+            <a:solidFill>
+              <a:srgbClr val="000000"/>
+            </a:solidFill>
+            <a:round/>
+          </a:ln>
+        </p:spPr>
+      </p:cxnSp>
+      <p:sp>
+        <p:nvSpPr>
+          <p:cNvPr id="330" name="CustomShape 95"/>
+          <p:cNvSpPr/>
+          <p:nvPr/>
+        </p:nvSpPr>
+        <p:spPr>
+          <a:xfrm>
+            <a:off x="4129451" y="4180603"/>
+            <a:ext cx="838080" cy="304560"/>
+          </a:xfrm>
+          <a:prstGeom prst="ellipse">
+            <a:avLst/>
+          </a:prstGeom>
+          <a:solidFill>
+            <a:srgbClr val="FFFFFF"/>
+          </a:solidFill>
+          <a:ln w="3240">
+            <a:solidFill>
+              <a:srgbClr val="000000"/>
+            </a:solidFill>
+            <a:miter/>
+          </a:ln>
+        </p:spPr>
+        <p:style>
+          <a:lnRef idx="0">
+            <a:scrgbClr r="0" g="0" b="0"/>
+          </a:lnRef>
+          <a:fillRef idx="0">
+            <a:scrgbClr r="0" g="0" b="0"/>
+          </a:fillRef>
+          <a:effectRef idx="0">
+            <a:scrgbClr r="0" g="0" b="0"/>
+          </a:effectRef>
+          <a:fontRef idx="minor"/>
+        </p:style>
+        <p:txBody>
+          <a:bodyPr wrap="none" lIns="90000" tIns="46800" rIns="90000" bIns="46800" anchor="ctr"/>
+          <a:lstStyle/>
+          <a:p>
+            <a:pPr algn="ctr">
+              <a:lnSpc>
+                <a:spcPct val="100000"/>
+              </a:lnSpc>
+            </a:pPr>
+            <a:r>
+              <a:rPr lang="en-US" sz="1200" dirty="0" smtClean="0">
+                <a:latin typeface="Arial"/>
+              </a:rPr>
+              <a:t>key</a:t>
+            </a:r>
+            <a:endParaRPr dirty="0"/>
+          </a:p>
+        </p:txBody>
+      </p:sp>
+      <p:cxnSp>
+        <p:nvCxnSpPr>
+          <p:cNvPr id="331" name="Line 83"/>
+          <p:cNvCxnSpPr>
+            <a:stCxn id="304" idx="2"/>
+            <a:endCxn id="330" idx="0"/>
+          </p:cNvCxnSpPr>
+          <p:nvPr/>
+        </p:nvCxnSpPr>
+        <p:spPr>
+          <a:xfrm rot="16200000" flipH="1">
+            <a:off x="4452437" y="4084548"/>
+            <a:ext cx="160751" cy="31357"/>
+          </a:xfrm>
+          <a:prstGeom prst="bentConnector3">
+            <a:avLst>
+              <a:gd name="adj1" fmla="val 50000"/>
+            </a:avLst>
+          </a:prstGeom>
+          <a:ln w="9360">
+            <a:solidFill>
+              <a:srgbClr val="000000"/>
+            </a:solidFill>
+            <a:round/>
+          </a:ln>
+        </p:spPr>
+      </p:cxnSp>
+      <p:sp>
+        <p:nvSpPr>
+          <p:cNvPr id="336" name="CustomShape 14"/>
+          <p:cNvSpPr/>
+          <p:nvPr/>
+        </p:nvSpPr>
+        <p:spPr>
+          <a:xfrm>
+            <a:off x="2260807" y="3309914"/>
+            <a:ext cx="1295640" cy="609480"/>
+          </a:xfrm>
+          <a:prstGeom prst="diamond">
+            <a:avLst/>
+          </a:prstGeom>
+          <a:noFill/>
+          <a:ln w="3240">
+            <a:solidFill>
+              <a:srgbClr val="000000"/>
+            </a:solidFill>
+            <a:miter/>
+          </a:ln>
+        </p:spPr>
+        <p:style>
+          <a:lnRef idx="0">
+            <a:scrgbClr r="0" g="0" b="0"/>
+          </a:lnRef>
+          <a:fillRef idx="0">
+            <a:scrgbClr r="0" g="0" b="0"/>
+          </a:fillRef>
+          <a:effectRef idx="0">
+            <a:scrgbClr r="0" g="0" b="0"/>
+          </a:effectRef>
+          <a:fontRef idx="minor"/>
+        </p:style>
+        <p:txBody>
+          <a:bodyPr wrap="none" lIns="90000" tIns="46800" rIns="90000" bIns="46800" anchor="ctr"/>
+          <a:lstStyle/>
+          <a:p>
+            <a:pPr algn="ctr">
+              <a:lnSpc>
+                <a:spcPct val="100000"/>
+              </a:lnSpc>
+            </a:pPr>
+            <a:r>
+              <a:rPr lang="en-US" sz="1200" b="1" dirty="0" smtClean="0">
+                <a:latin typeface="Arial"/>
+              </a:rPr>
+              <a:t>performs</a:t>
+            </a:r>
+            <a:endParaRPr dirty="0"/>
+          </a:p>
+        </p:txBody>
+      </p:sp>
+      <p:sp>
+        <p:nvSpPr>
+          <p:cNvPr id="337" name="TextBox 336"/>
+          <p:cNvSpPr txBox="1"/>
+          <p:nvPr/>
+        </p:nvSpPr>
+        <p:spPr>
+          <a:xfrm>
+            <a:off x="5517668" y="3622772"/>
+            <a:ext cx="295274" cy="276999"/>
+          </a:xfrm>
+          <a:prstGeom prst="rect">
+            <a:avLst/>
+          </a:prstGeom>
+          <a:noFill/>
+        </p:spPr>
+        <p:txBody>
+          <a:bodyPr wrap="none" rtlCol="0">
+            <a:spAutoFit/>
+          </a:bodyPr>
+          <a:lstStyle/>
+          <a:p>
+            <a:r>
+              <a:rPr lang="en-US" sz="1200" dirty="0" smtClean="0"/>
+              <a:t>N</a:t>
+            </a:r>
+            <a:endParaRPr lang="en-US" sz="1200" dirty="0"/>
+          </a:p>
+        </p:txBody>
+      </p:sp>
+      <p:sp>
+        <p:nvSpPr>
+          <p:cNvPr id="338" name="TextBox 337"/>
+          <p:cNvSpPr txBox="1"/>
+          <p:nvPr/>
+        </p:nvSpPr>
+        <p:spPr>
+          <a:xfrm>
+            <a:off x="6139394" y="3319544"/>
+            <a:ext cx="269626" cy="276999"/>
+          </a:xfrm>
+          <a:prstGeom prst="rect">
+            <a:avLst/>
+          </a:prstGeom>
+          <a:noFill/>
+        </p:spPr>
+        <p:txBody>
+          <a:bodyPr wrap="none" rtlCol="0">
+            <a:spAutoFit/>
+          </a:bodyPr>
+          <a:lstStyle/>
+          <a:p>
+            <a:r>
+              <a:rPr lang="en-US" sz="1200" dirty="0" smtClean="0"/>
+              <a:t>1</a:t>
+            </a:r>
+            <a:endParaRPr lang="en-US" sz="1200" dirty="0"/>
+          </a:p>
+        </p:txBody>
+      </p:sp>
+      <p:cxnSp>
+        <p:nvCxnSpPr>
+          <p:cNvPr id="339" name="Line 83"/>
+          <p:cNvCxnSpPr>
+            <a:stCxn id="304" idx="1"/>
+            <a:endCxn id="336" idx="3"/>
+          </p:cNvCxnSpPr>
+          <p:nvPr/>
+        </p:nvCxnSpPr>
+        <p:spPr>
+          <a:xfrm rot="10800000">
+            <a:off x="3556448" y="3614654"/>
+            <a:ext cx="304947" cy="206658"/>
+          </a:xfrm>
+          <a:prstGeom prst="bentConnector3">
+            <a:avLst>
+              <a:gd name="adj1" fmla="val 50000"/>
+            </a:avLst>
+          </a:prstGeom>
+          <a:ln w="9360">
+            <a:solidFill>
+              <a:srgbClr val="000000"/>
+            </a:solidFill>
+            <a:round/>
+          </a:ln>
+        </p:spPr>
+      </p:cxnSp>
+      <p:cxnSp>
+        <p:nvCxnSpPr>
+          <p:cNvPr id="342" name="Line 83"/>
+          <p:cNvCxnSpPr>
+            <a:stCxn id="336" idx="1"/>
+            <a:endCxn id="234" idx="3"/>
+          </p:cNvCxnSpPr>
+          <p:nvPr/>
+        </p:nvCxnSpPr>
+        <p:spPr>
+          <a:xfrm rot="10800000">
+            <a:off x="1686961" y="3421290"/>
+            <a:ext cx="573847" cy="193364"/>
+          </a:xfrm>
+          <a:prstGeom prst="bentConnector3">
+            <a:avLst>
+              <a:gd name="adj1" fmla="val 50000"/>
+            </a:avLst>
+          </a:prstGeom>
+          <a:ln w="9360">
+            <a:solidFill>
+              <a:srgbClr val="000000"/>
+            </a:solidFill>
+            <a:round/>
+          </a:ln>
+        </p:spPr>
+      </p:cxnSp>
+      <p:sp>
+        <p:nvSpPr>
+          <p:cNvPr id="346" name="TextBox 345"/>
+          <p:cNvSpPr txBox="1"/>
+          <p:nvPr/>
+        </p:nvSpPr>
+        <p:spPr>
+          <a:xfrm>
+            <a:off x="2058912" y="3361928"/>
+            <a:ext cx="295274" cy="276999"/>
+          </a:xfrm>
+          <a:prstGeom prst="rect">
+            <a:avLst/>
+          </a:prstGeom>
+          <a:noFill/>
+        </p:spPr>
+        <p:txBody>
+          <a:bodyPr wrap="none" rtlCol="0">
+            <a:spAutoFit/>
+          </a:bodyPr>
+          <a:lstStyle/>
+          <a:p>
+            <a:r>
+              <a:rPr lang="en-US" sz="1200" dirty="0" smtClean="0"/>
+              <a:t>N</a:t>
+            </a:r>
+            <a:endParaRPr lang="en-US" sz="1200" dirty="0"/>
+          </a:p>
+        </p:txBody>
+      </p:sp>
+      <p:sp>
+        <p:nvSpPr>
+          <p:cNvPr id="349" name="TextBox 348"/>
+          <p:cNvSpPr txBox="1"/>
+          <p:nvPr/>
+        </p:nvSpPr>
+        <p:spPr>
+          <a:xfrm>
+            <a:off x="3470815" y="3359912"/>
+            <a:ext cx="269626" cy="276999"/>
+          </a:xfrm>
+          <a:prstGeom prst="rect">
+            <a:avLst/>
+          </a:prstGeom>
+          <a:noFill/>
+        </p:spPr>
+        <p:txBody>
+          <a:bodyPr wrap="none" rtlCol="0">
+            <a:spAutoFit/>
+          </a:bodyPr>
+          <a:lstStyle/>
+          <a:p>
+            <a:r>
+              <a:rPr lang="en-US" sz="1200" dirty="0" smtClean="0"/>
+              <a:t>1</a:t>
+            </a:r>
+            <a:endParaRPr lang="en-US" sz="1200" dirty="0"/>
+          </a:p>
+        </p:txBody>
+      </p:sp>
     </p:spTree>
   </p:cSld>
   <p:clrMapOvr>

</xml_diff>